<commit_message>
presentation: small fixes to PL presentation, mostly wording
</commit_message>
<xml_diff>
--- a/presentation/SpecFlow-intro-pl.pptx
+++ b/presentation/SpecFlow-intro-pl.pptx
@@ -214,6 +214,7 @@
           <a:p>
             <a:fld id="{4427C4AC-D1BE-4828-8F09-ED9E9A720EB7}" type="datetimeFigureOut">
               <a:rPr lang="pl-PL" smtClean="0"/>
+              <a:pPr/>
               <a:t>2019-01-13</a:t>
             </a:fld>
             <a:endParaRPr lang="pl-PL"/>
@@ -375,6 +376,7 @@
           <a:p>
             <a:fld id="{A665350E-32F9-478C-946E-D798B93EDEE4}" type="slidenum">
               <a:rPr lang="pl-PL" smtClean="0"/>
+              <a:pPr/>
               <a:t>‹#›</a:t>
             </a:fld>
             <a:endParaRPr lang="pl-PL"/>
@@ -546,6 +548,7 @@
           <a:p>
             <a:fld id="{A665350E-32F9-478C-946E-D798B93EDEE4}" type="slidenum">
               <a:rPr lang="pl-PL" smtClean="0"/>
+              <a:pPr/>
               <a:t>8</a:t>
             </a:fld>
             <a:endParaRPr lang="pl-PL"/>
@@ -596,6 +599,7 @@
           <a:p>
             <a:fld id="{6D665BB9-288C-4161-8457-CA8B183134BE}" type="datetimeFigureOut">
               <a:rPr lang="pl-PL" smtClean="0"/>
+              <a:pPr/>
               <a:t>2019-01-13</a:t>
             </a:fld>
             <a:endParaRPr lang="pl-PL"/>
@@ -642,6 +646,7 @@
           <a:p>
             <a:fld id="{92838232-0870-429C-9343-F1E06224BF80}" type="slidenum">
               <a:rPr lang="pl-PL" smtClean="0"/>
+              <a:pPr/>
               <a:t>‹#›</a:t>
             </a:fld>
             <a:endParaRPr lang="pl-PL"/>
@@ -1313,6 +1318,7 @@
           <a:p>
             <a:fld id="{6D665BB9-288C-4161-8457-CA8B183134BE}" type="datetimeFigureOut">
               <a:rPr lang="pl-PL" smtClean="0"/>
+              <a:pPr/>
               <a:t>2019-01-13</a:t>
             </a:fld>
             <a:endParaRPr lang="pl-PL"/>
@@ -1359,6 +1365,7 @@
           <a:p>
             <a:fld id="{92838232-0870-429C-9343-F1E06224BF80}" type="slidenum">
               <a:rPr lang="pl-PL" smtClean="0"/>
+              <a:pPr/>
               <a:t>‹#›</a:t>
             </a:fld>
             <a:endParaRPr lang="pl-PL"/>
@@ -1498,6 +1505,7 @@
           <a:p>
             <a:fld id="{6D665BB9-288C-4161-8457-CA8B183134BE}" type="datetimeFigureOut">
               <a:rPr lang="pl-PL" smtClean="0"/>
+              <a:pPr/>
               <a:t>2019-01-13</a:t>
             </a:fld>
             <a:endParaRPr lang="pl-PL"/>
@@ -1544,6 +1552,7 @@
           <a:p>
             <a:fld id="{92838232-0870-429C-9343-F1E06224BF80}" type="slidenum">
               <a:rPr lang="pl-PL" smtClean="0"/>
+              <a:pPr/>
               <a:t>‹#›</a:t>
             </a:fld>
             <a:endParaRPr lang="pl-PL"/>
@@ -1673,6 +1682,7 @@
           <a:p>
             <a:fld id="{6D665BB9-288C-4161-8457-CA8B183134BE}" type="datetimeFigureOut">
               <a:rPr lang="pl-PL" smtClean="0"/>
+              <a:pPr/>
               <a:t>2019-01-13</a:t>
             </a:fld>
             <a:endParaRPr lang="pl-PL"/>
@@ -1719,6 +1729,7 @@
           <a:p>
             <a:fld id="{92838232-0870-429C-9343-F1E06224BF80}" type="slidenum">
               <a:rPr lang="pl-PL" smtClean="0"/>
+              <a:pPr/>
               <a:t>‹#›</a:t>
             </a:fld>
             <a:endParaRPr lang="pl-PL"/>
@@ -3156,6 +3167,7 @@
           <a:p>
             <a:fld id="{6D665BB9-288C-4161-8457-CA8B183134BE}" type="datetimeFigureOut">
               <a:rPr lang="pl-PL" smtClean="0"/>
+              <a:pPr/>
               <a:t>2019-01-13</a:t>
             </a:fld>
             <a:endParaRPr lang="pl-PL"/>
@@ -3202,6 +3214,7 @@
           <a:p>
             <a:fld id="{92838232-0870-429C-9343-F1E06224BF80}" type="slidenum">
               <a:rPr lang="pl-PL" smtClean="0"/>
+              <a:pPr/>
               <a:t>‹#›</a:t>
             </a:fld>
             <a:endParaRPr lang="pl-PL"/>
@@ -3756,6 +3769,7 @@
           <a:p>
             <a:fld id="{6D665BB9-288C-4161-8457-CA8B183134BE}" type="datetimeFigureOut">
               <a:rPr lang="pl-PL" smtClean="0"/>
+              <a:pPr/>
               <a:t>2019-01-13</a:t>
             </a:fld>
             <a:endParaRPr lang="pl-PL"/>
@@ -3802,6 +3816,7 @@
           <a:p>
             <a:fld id="{92838232-0870-429C-9343-F1E06224BF80}" type="slidenum">
               <a:rPr lang="pl-PL" smtClean="0"/>
+              <a:pPr/>
               <a:t>‹#›</a:t>
             </a:fld>
             <a:endParaRPr lang="pl-PL"/>
@@ -4193,6 +4208,7 @@
           <a:p>
             <a:fld id="{6D665BB9-288C-4161-8457-CA8B183134BE}" type="datetimeFigureOut">
               <a:rPr lang="pl-PL" smtClean="0"/>
+              <a:pPr/>
               <a:t>2019-01-13</a:t>
             </a:fld>
             <a:endParaRPr lang="pl-PL"/>
@@ -4239,6 +4255,7 @@
           <a:p>
             <a:fld id="{92838232-0870-429C-9343-F1E06224BF80}" type="slidenum">
               <a:rPr lang="pl-PL" smtClean="0"/>
+              <a:pPr/>
               <a:t>‹#›</a:t>
             </a:fld>
             <a:endParaRPr lang="pl-PL"/>
@@ -4754,6 +4771,7 @@
           <a:p>
             <a:fld id="{6D665BB9-288C-4161-8457-CA8B183134BE}" type="datetimeFigureOut">
               <a:rPr lang="pl-PL" smtClean="0"/>
+              <a:pPr/>
               <a:t>2019-01-13</a:t>
             </a:fld>
             <a:endParaRPr lang="pl-PL"/>
@@ -4800,6 +4818,7 @@
           <a:p>
             <a:fld id="{92838232-0870-429C-9343-F1E06224BF80}" type="slidenum">
               <a:rPr lang="pl-PL" smtClean="0"/>
+              <a:pPr/>
               <a:t>‹#›</a:t>
             </a:fld>
             <a:endParaRPr lang="pl-PL"/>
@@ -4850,6 +4869,7 @@
           <a:p>
             <a:fld id="{6D665BB9-288C-4161-8457-CA8B183134BE}" type="datetimeFigureOut">
               <a:rPr lang="pl-PL" smtClean="0"/>
+              <a:pPr/>
               <a:t>2019-01-13</a:t>
             </a:fld>
             <a:endParaRPr lang="pl-PL"/>
@@ -4896,6 +4916,7 @@
           <a:p>
             <a:fld id="{92838232-0870-429C-9343-F1E06224BF80}" type="slidenum">
               <a:rPr lang="pl-PL" smtClean="0"/>
+              <a:pPr/>
               <a:t>‹#›</a:t>
             </a:fld>
             <a:endParaRPr lang="pl-PL"/>
@@ -5104,6 +5125,7 @@
           <a:p>
             <a:fld id="{6D665BB9-288C-4161-8457-CA8B183134BE}" type="datetimeFigureOut">
               <a:rPr lang="pl-PL" smtClean="0"/>
+              <a:pPr/>
               <a:t>2019-01-13</a:t>
             </a:fld>
             <a:endParaRPr lang="pl-PL"/>
@@ -5150,6 +5172,7 @@
           <a:p>
             <a:fld id="{92838232-0870-429C-9343-F1E06224BF80}" type="slidenum">
               <a:rPr lang="pl-PL" smtClean="0"/>
+              <a:pPr/>
               <a:t>‹#›</a:t>
             </a:fld>
             <a:endParaRPr lang="pl-PL"/>
@@ -5825,6 +5848,7 @@
           <a:p>
             <a:fld id="{6D665BB9-288C-4161-8457-CA8B183134BE}" type="datetimeFigureOut">
               <a:rPr lang="pl-PL" smtClean="0"/>
+              <a:pPr/>
               <a:t>2019-01-13</a:t>
             </a:fld>
             <a:endParaRPr lang="pl-PL"/>
@@ -5881,6 +5905,7 @@
           <a:p>
             <a:fld id="{92838232-0870-429C-9343-F1E06224BF80}" type="slidenum">
               <a:rPr lang="pl-PL" smtClean="0"/>
+              <a:pPr/>
               <a:t>‹#›</a:t>
             </a:fld>
             <a:endParaRPr lang="pl-PL"/>
@@ -6498,6 +6523,7 @@
           <a:p>
             <a:fld id="{6D665BB9-288C-4161-8457-CA8B183134BE}" type="datetimeFigureOut">
               <a:rPr lang="pl-PL" smtClean="0"/>
+              <a:pPr/>
               <a:t>2019-01-13</a:t>
             </a:fld>
             <a:endParaRPr lang="pl-PL"/>
@@ -6574,6 +6600,7 @@
           <a:p>
             <a:fld id="{92838232-0870-429C-9343-F1E06224BF80}" type="slidenum">
               <a:rPr lang="pl-PL" smtClean="0"/>
+              <a:pPr/>
               <a:t>‹#›</a:t>
             </a:fld>
             <a:endParaRPr lang="pl-PL"/>
@@ -7851,19 +7878,10 @@
           <a:lstStyle/>
           <a:p>
             <a:r>
-              <a:rPr lang="pl-PL" dirty="0" err="1" smtClean="0"/>
-              <a:t>Code-behind</a:t>
-            </a:r>
-            <a:r>
               <a:rPr lang="pl-PL" dirty="0" smtClean="0"/>
-              <a:t> jako artefakt budowania</a:t>
-            </a:r>
-          </a:p>
-          <a:p>
-            <a:r>
-              <a:rPr lang="pl-PL" dirty="0" smtClean="0"/>
-              <a:t>Własne DI</a:t>
-            </a:r>
+              <a:t>Podłączenie własnego DI</a:t>
+            </a:r>
+            <a:endParaRPr lang="pl-PL" dirty="0" smtClean="0"/>
           </a:p>
           <a:p>
             <a:r>
@@ -7880,8 +7898,13 @@
           <a:p>
             <a:r>
               <a:rPr lang="pl-PL" dirty="0" smtClean="0"/>
-              <a:t>„Przestarzałe” scenariusze</a:t>
-            </a:r>
+              <a:t>„Przestarzałe” </a:t>
+            </a:r>
+            <a:r>
+              <a:rPr lang="pl-PL" dirty="0" smtClean="0"/>
+              <a:t>kroki</a:t>
+            </a:r>
+            <a:endParaRPr lang="pl-PL" dirty="0" smtClean="0"/>
           </a:p>
           <a:p>
             <a:r>
@@ -7972,13 +7995,7 @@
               <a:rPr lang="pl-PL" dirty="0" smtClean="0">
                 <a:hlinkClick r:id="rId2"/>
               </a:rPr>
-              <a:t>https://github.com/melchiork</a:t>
-            </a:r>
-            <a:r>
-              <a:rPr lang="pl-PL" dirty="0" smtClean="0">
-                <a:hlinkClick r:id="rId2"/>
-              </a:rPr>
-              <a:t>/</a:t>
+              <a:t>https://github.com/melchiork/</a:t>
             </a:r>
             <a:endParaRPr lang="pl-PL" dirty="0" smtClean="0"/>
           </a:p>
@@ -7995,7 +8012,6 @@
               <a:rPr lang="pl-PL" dirty="0" smtClean="0"/>
               <a:t> Software</a:t>
             </a:r>
-            <a:endParaRPr lang="pl-PL" dirty="0" smtClean="0"/>
           </a:p>
           <a:p>
             <a:endParaRPr lang="pl-PL" dirty="0" smtClean="0"/>
@@ -8208,13 +8224,7 @@
               <a:rPr lang="pl-PL" dirty="0" smtClean="0">
                 <a:hlinkClick r:id="rId2"/>
               </a:rPr>
-              <a:t>https://</a:t>
-            </a:r>
-            <a:r>
-              <a:rPr lang="pl-PL" dirty="0" smtClean="0">
-                <a:hlinkClick r:id="rId2"/>
-              </a:rPr>
-              <a:t>github.com/techtalk/SpecFlow</a:t>
+              <a:t>https://github.com/techtalk/SpecFlow</a:t>
             </a:r>
             <a:endParaRPr lang="pl-PL" dirty="0" smtClean="0"/>
           </a:p>
@@ -8340,13 +8350,7 @@
               <a:rPr lang="pl-PL" dirty="0" smtClean="0">
                 <a:hlinkClick r:id="rId2"/>
               </a:rPr>
-              <a:t>https://</a:t>
-            </a:r>
-            <a:r>
-              <a:rPr lang="pl-PL" dirty="0" smtClean="0">
-                <a:hlinkClick r:id="rId2"/>
-              </a:rPr>
-              <a:t>github.com/melchiork/SpecFlow-Introduction</a:t>
+              <a:t>https://github.com/melchiork/SpecFlow-Introduction</a:t>
             </a:r>
             <a:endParaRPr lang="pl-PL" dirty="0" smtClean="0"/>
           </a:p>
@@ -8611,8 +8615,13 @@
             </a:r>
             <a:r>
               <a:rPr lang="pl-PL" dirty="0" smtClean="0"/>
-              <a:t> wymagania wstępne są ustalone</a:t>
-            </a:r>
+              <a:t> wymagania wstępne są </a:t>
+            </a:r>
+            <a:r>
+              <a:rPr lang="pl-PL" dirty="0" smtClean="0"/>
+              <a:t>ustalone</a:t>
+            </a:r>
+            <a:endParaRPr lang="pl-PL" dirty="0" smtClean="0"/>
           </a:p>
           <a:p>
             <a:pPr>
@@ -8777,7 +8786,11 @@
             </a:r>
             <a:r>
               <a:rPr lang="pl-PL" dirty="0" smtClean="0"/>
-              <a:t> promuję artykuł </a:t>
+              <a:t> promuję </a:t>
+            </a:r>
+            <a:r>
+              <a:rPr lang="pl-PL" dirty="0" smtClean="0"/>
+              <a:t>artykuł o tytule </a:t>
             </a:r>
             <a:r>
               <a:rPr lang="pl-PL" i="1" dirty="0" smtClean="0">
@@ -8787,6 +8800,11 @@
               </a:rPr>
               <a:t>BDD</a:t>
             </a:r>
+            <a:endParaRPr lang="pl-PL" i="1" dirty="0" smtClean="0">
+              <a:solidFill>
+                <a:schemeClr val="bg2"/>
+              </a:solidFill>
+            </a:endParaRPr>
           </a:p>
           <a:p>
             <a:pPr>
@@ -8810,8 +8828,13 @@
             </a:r>
             <a:r>
               <a:rPr lang="pl-PL" dirty="0" smtClean="0"/>
-              <a:t> jest na stronie głównej</a:t>
-            </a:r>
+              <a:t> jest </a:t>
+            </a:r>
+            <a:r>
+              <a:rPr lang="pl-PL" dirty="0" smtClean="0"/>
+              <a:t>na stronie głównej</a:t>
+            </a:r>
+            <a:endParaRPr lang="pl-PL" dirty="0" smtClean="0"/>
           </a:p>
           <a:p>
             <a:pPr>
@@ -8886,11 +8909,6 @@
               </a:rPr>
               <a:t>Atom</a:t>
             </a:r>
-            <a:endParaRPr lang="pl-PL" i="1" dirty="0" smtClean="0">
-              <a:solidFill>
-                <a:schemeClr val="bg2"/>
-              </a:solidFill>
-            </a:endParaRPr>
           </a:p>
         </p:txBody>
       </p:sp>

</xml_diff>

<commit_message>
presentation: typos and new example architecture slide
</commit_message>
<xml_diff>
--- a/presentation/SpecFlow-intro-pl.pptx
+++ b/presentation/SpecFlow-intro-pl.pptx
@@ -5,7 +5,7 @@
     <p:sldMasterId id="2147483852" r:id="rId1"/>
   </p:sldMasterIdLst>
   <p:notesMasterIdLst>
-    <p:notesMasterId r:id="rId25"/>
+    <p:notesMasterId r:id="rId26"/>
   </p:notesMasterIdLst>
   <p:sldIdLst>
     <p:sldId id="256" r:id="rId2"/>
@@ -13,24 +13,25 @@
     <p:sldId id="258" r:id="rId4"/>
     <p:sldId id="260" r:id="rId5"/>
     <p:sldId id="263" r:id="rId6"/>
-    <p:sldId id="259" r:id="rId7"/>
-    <p:sldId id="267" r:id="rId8"/>
-    <p:sldId id="266" r:id="rId9"/>
-    <p:sldId id="268" r:id="rId10"/>
-    <p:sldId id="269" r:id="rId11"/>
-    <p:sldId id="274" r:id="rId12"/>
-    <p:sldId id="271" r:id="rId13"/>
-    <p:sldId id="272" r:id="rId14"/>
-    <p:sldId id="273" r:id="rId15"/>
-    <p:sldId id="276" r:id="rId16"/>
-    <p:sldId id="279" r:id="rId17"/>
-    <p:sldId id="278" r:id="rId18"/>
-    <p:sldId id="275" r:id="rId19"/>
-    <p:sldId id="277" r:id="rId20"/>
-    <p:sldId id="264" r:id="rId21"/>
-    <p:sldId id="265" r:id="rId22"/>
-    <p:sldId id="261" r:id="rId23"/>
-    <p:sldId id="262" r:id="rId24"/>
+    <p:sldId id="280" r:id="rId7"/>
+    <p:sldId id="259" r:id="rId8"/>
+    <p:sldId id="267" r:id="rId9"/>
+    <p:sldId id="266" r:id="rId10"/>
+    <p:sldId id="268" r:id="rId11"/>
+    <p:sldId id="269" r:id="rId12"/>
+    <p:sldId id="274" r:id="rId13"/>
+    <p:sldId id="271" r:id="rId14"/>
+    <p:sldId id="272" r:id="rId15"/>
+    <p:sldId id="273" r:id="rId16"/>
+    <p:sldId id="276" r:id="rId17"/>
+    <p:sldId id="279" r:id="rId18"/>
+    <p:sldId id="278" r:id="rId19"/>
+    <p:sldId id="275" r:id="rId20"/>
+    <p:sldId id="277" r:id="rId21"/>
+    <p:sldId id="264" r:id="rId22"/>
+    <p:sldId id="265" r:id="rId23"/>
+    <p:sldId id="261" r:id="rId24"/>
+    <p:sldId id="262" r:id="rId25"/>
   </p:sldIdLst>
   <p:sldSz cx="9144000" cy="6858000" type="screen4x3"/>
   <p:notesSz cx="6858000" cy="9144000"/>
@@ -181,7 +182,7 @@
             </a:lvl1pPr>
           </a:lstStyle>
           <a:p>
-            <a:endParaRPr lang="pl-PL"/>
+            <a:endParaRPr lang="pl-PL" dirty="0"/>
           </a:p>
         </p:txBody>
       </p:sp>
@@ -215,9 +216,9 @@
             <a:fld id="{4427C4AC-D1BE-4828-8F09-ED9E9A720EB7}" type="datetimeFigureOut">
               <a:rPr lang="pl-PL" smtClean="0"/>
               <a:pPr/>
-              <a:t>2019-01-13</a:t>
+              <a:t>2019-01-14</a:t>
             </a:fld>
-            <a:endParaRPr lang="pl-PL"/>
+            <a:endParaRPr lang="pl-PL" dirty="0"/>
           </a:p>
         </p:txBody>
       </p:sp>
@@ -250,7 +251,7 @@
           <a:bodyPr vert="horz" lIns="91440" tIns="45720" rIns="91440" bIns="45720" rtlCol="0" anchor="ctr"/>
           <a:lstStyle/>
           <a:p>
-            <a:endParaRPr lang="pl-PL"/>
+            <a:endParaRPr lang="pl-PL" dirty="0"/>
           </a:p>
         </p:txBody>
       </p:sp>
@@ -343,7 +344,7 @@
             </a:lvl1pPr>
           </a:lstStyle>
           <a:p>
-            <a:endParaRPr lang="pl-PL"/>
+            <a:endParaRPr lang="pl-PL" dirty="0"/>
           </a:p>
         </p:txBody>
       </p:sp>
@@ -379,7 +380,7 @@
               <a:pPr/>
               <a:t>‹#›</a:t>
             </a:fld>
-            <a:endParaRPr lang="pl-PL"/>
+            <a:endParaRPr lang="pl-PL" dirty="0"/>
           </a:p>
         </p:txBody>
       </p:sp>
@@ -549,9 +550,9 @@
             <a:fld id="{A665350E-32F9-478C-946E-D798B93EDEE4}" type="slidenum">
               <a:rPr lang="pl-PL" smtClean="0"/>
               <a:pPr/>
-              <a:t>8</a:t>
+              <a:t>9</a:t>
             </a:fld>
-            <a:endParaRPr lang="pl-PL"/>
+            <a:endParaRPr lang="pl-PL" dirty="0"/>
           </a:p>
         </p:txBody>
       </p:sp>
@@ -600,9 +601,9 @@
             <a:fld id="{6D665BB9-288C-4161-8457-CA8B183134BE}" type="datetimeFigureOut">
               <a:rPr lang="pl-PL" smtClean="0"/>
               <a:pPr/>
-              <a:t>2019-01-13</a:t>
+              <a:t>2019-01-14</a:t>
             </a:fld>
-            <a:endParaRPr lang="pl-PL"/>
+            <a:endParaRPr lang="pl-PL" dirty="0"/>
           </a:p>
         </p:txBody>
       </p:sp>
@@ -623,7 +624,7 @@
             <a:extLst/>
           </a:lstStyle>
           <a:p>
-            <a:endParaRPr lang="pl-PL"/>
+            <a:endParaRPr lang="pl-PL" dirty="0"/>
           </a:p>
         </p:txBody>
       </p:sp>
@@ -649,7 +650,7 @@
               <a:pPr/>
               <a:t>‹#›</a:t>
             </a:fld>
-            <a:endParaRPr lang="pl-PL"/>
+            <a:endParaRPr lang="pl-PL" dirty="0"/>
           </a:p>
         </p:txBody>
       </p:sp>
@@ -699,7 +700,7 @@
           </a:lstStyle>
           <a:p>
             <a:pPr algn="ctr" eaLnBrk="1" latinLnBrk="0" hangingPunct="1"/>
-            <a:endParaRPr kumimoji="0" lang="en-US"/>
+            <a:endParaRPr kumimoji="0" lang="en-US" dirty="0"/>
           </a:p>
         </p:txBody>
       </p:sp>
@@ -843,7 +844,7 @@
           </a:lstStyle>
           <a:p>
             <a:pPr algn="ctr" eaLnBrk="1" latinLnBrk="0" hangingPunct="1"/>
-            <a:endParaRPr kumimoji="0" lang="en-US"/>
+            <a:endParaRPr kumimoji="0" lang="en-US" dirty="0"/>
           </a:p>
         </p:txBody>
       </p:sp>
@@ -1043,7 +1044,7 @@
           </a:lstStyle>
           <a:p>
             <a:pPr algn="ctr" eaLnBrk="1" latinLnBrk="0" hangingPunct="1"/>
-            <a:endParaRPr kumimoji="0" lang="en-US"/>
+            <a:endParaRPr kumimoji="0" lang="en-US" dirty="0"/>
           </a:p>
         </p:txBody>
       </p:sp>
@@ -1093,7 +1094,7 @@
           </a:lstStyle>
           <a:p>
             <a:pPr algn="ctr" eaLnBrk="1" latinLnBrk="0" hangingPunct="1"/>
-            <a:endParaRPr kumimoji="0" lang="en-US"/>
+            <a:endParaRPr kumimoji="0" lang="en-US" dirty="0"/>
           </a:p>
         </p:txBody>
       </p:sp>
@@ -1141,7 +1142,7 @@
           </a:lstStyle>
           <a:p>
             <a:pPr algn="ctr" eaLnBrk="1" latinLnBrk="0" hangingPunct="1"/>
-            <a:endParaRPr kumimoji="0" lang="en-US"/>
+            <a:endParaRPr kumimoji="0" lang="en-US" dirty="0"/>
           </a:p>
         </p:txBody>
       </p:sp>
@@ -1319,9 +1320,9 @@
             <a:fld id="{6D665BB9-288C-4161-8457-CA8B183134BE}" type="datetimeFigureOut">
               <a:rPr lang="pl-PL" smtClean="0"/>
               <a:pPr/>
-              <a:t>2019-01-13</a:t>
+              <a:t>2019-01-14</a:t>
             </a:fld>
-            <a:endParaRPr lang="pl-PL"/>
+            <a:endParaRPr lang="pl-PL" dirty="0"/>
           </a:p>
         </p:txBody>
       </p:sp>
@@ -1342,7 +1343,7 @@
             <a:extLst/>
           </a:lstStyle>
           <a:p>
-            <a:endParaRPr lang="pl-PL"/>
+            <a:endParaRPr lang="pl-PL" dirty="0"/>
           </a:p>
         </p:txBody>
       </p:sp>
@@ -1368,7 +1369,7 @@
               <a:pPr/>
               <a:t>‹#›</a:t>
             </a:fld>
-            <a:endParaRPr lang="pl-PL"/>
+            <a:endParaRPr lang="pl-PL" dirty="0"/>
           </a:p>
         </p:txBody>
       </p:sp>
@@ -1506,9 +1507,9 @@
             <a:fld id="{6D665BB9-288C-4161-8457-CA8B183134BE}" type="datetimeFigureOut">
               <a:rPr lang="pl-PL" smtClean="0"/>
               <a:pPr/>
-              <a:t>2019-01-13</a:t>
+              <a:t>2019-01-14</a:t>
             </a:fld>
-            <a:endParaRPr lang="pl-PL"/>
+            <a:endParaRPr lang="pl-PL" dirty="0"/>
           </a:p>
         </p:txBody>
       </p:sp>
@@ -1529,7 +1530,7 @@
             <a:extLst/>
           </a:lstStyle>
           <a:p>
-            <a:endParaRPr lang="pl-PL"/>
+            <a:endParaRPr lang="pl-PL" dirty="0"/>
           </a:p>
         </p:txBody>
       </p:sp>
@@ -1555,7 +1556,7 @@
               <a:pPr/>
               <a:t>‹#›</a:t>
             </a:fld>
-            <a:endParaRPr lang="pl-PL"/>
+            <a:endParaRPr lang="pl-PL" dirty="0"/>
           </a:p>
         </p:txBody>
       </p:sp>
@@ -1683,9 +1684,9 @@
             <a:fld id="{6D665BB9-288C-4161-8457-CA8B183134BE}" type="datetimeFigureOut">
               <a:rPr lang="pl-PL" smtClean="0"/>
               <a:pPr/>
-              <a:t>2019-01-13</a:t>
+              <a:t>2019-01-14</a:t>
             </a:fld>
-            <a:endParaRPr lang="pl-PL"/>
+            <a:endParaRPr lang="pl-PL" dirty="0"/>
           </a:p>
         </p:txBody>
       </p:sp>
@@ -1706,7 +1707,7 @@
             <a:extLst/>
           </a:lstStyle>
           <a:p>
-            <a:endParaRPr lang="pl-PL"/>
+            <a:endParaRPr lang="pl-PL" dirty="0"/>
           </a:p>
         </p:txBody>
       </p:sp>
@@ -1732,7 +1733,7 @@
               <a:pPr/>
               <a:t>‹#›</a:t>
             </a:fld>
-            <a:endParaRPr lang="pl-PL"/>
+            <a:endParaRPr lang="pl-PL" dirty="0"/>
           </a:p>
         </p:txBody>
       </p:sp>
@@ -1858,7 +1859,7 @@
             <a:extLst/>
           </a:lstStyle>
           <a:p>
-            <a:endParaRPr kumimoji="0" lang="en-US"/>
+            <a:endParaRPr kumimoji="0" lang="en-US" dirty="0"/>
           </a:p>
         </p:txBody>
       </p:sp>
@@ -1959,7 +1960,7 @@
             <a:extLst/>
           </a:lstStyle>
           <a:p>
-            <a:endParaRPr kumimoji="0" lang="en-US"/>
+            <a:endParaRPr kumimoji="0" lang="en-US" dirty="0"/>
           </a:p>
         </p:txBody>
       </p:sp>
@@ -2044,7 +2045,7 @@
             <a:extLst/>
           </a:lstStyle>
           <a:p>
-            <a:endParaRPr kumimoji="0" lang="en-US"/>
+            <a:endParaRPr kumimoji="0" lang="en-US" dirty="0"/>
           </a:p>
         </p:txBody>
       </p:sp>
@@ -2129,7 +2130,7 @@
             <a:extLst/>
           </a:lstStyle>
           <a:p>
-            <a:endParaRPr kumimoji="0" lang="en-US"/>
+            <a:endParaRPr kumimoji="0" lang="en-US" dirty="0"/>
           </a:p>
         </p:txBody>
       </p:sp>
@@ -2214,7 +2215,7 @@
             <a:extLst/>
           </a:lstStyle>
           <a:p>
-            <a:endParaRPr kumimoji="0" lang="en-US"/>
+            <a:endParaRPr kumimoji="0" lang="en-US" dirty="0"/>
           </a:p>
         </p:txBody>
       </p:sp>
@@ -2299,7 +2300,7 @@
             <a:extLst/>
           </a:lstStyle>
           <a:p>
-            <a:endParaRPr kumimoji="0" lang="en-US"/>
+            <a:endParaRPr kumimoji="0" lang="en-US" dirty="0"/>
           </a:p>
         </p:txBody>
       </p:sp>
@@ -2384,7 +2385,7 @@
             <a:extLst/>
           </a:lstStyle>
           <a:p>
-            <a:endParaRPr kumimoji="0" lang="en-US"/>
+            <a:endParaRPr kumimoji="0" lang="en-US" dirty="0"/>
           </a:p>
         </p:txBody>
       </p:sp>
@@ -2469,7 +2470,7 @@
             <a:extLst/>
           </a:lstStyle>
           <a:p>
-            <a:endParaRPr kumimoji="0" lang="en-US"/>
+            <a:endParaRPr kumimoji="0" lang="en-US" dirty="0"/>
           </a:p>
         </p:txBody>
       </p:sp>
@@ -2554,7 +2555,7 @@
             <a:extLst/>
           </a:lstStyle>
           <a:p>
-            <a:endParaRPr kumimoji="0" lang="en-US"/>
+            <a:endParaRPr kumimoji="0" lang="en-US" dirty="0"/>
           </a:p>
         </p:txBody>
       </p:sp>
@@ -2639,7 +2640,7 @@
             <a:extLst/>
           </a:lstStyle>
           <a:p>
-            <a:endParaRPr kumimoji="0" lang="en-US"/>
+            <a:endParaRPr kumimoji="0" lang="en-US" dirty="0"/>
           </a:p>
         </p:txBody>
       </p:sp>
@@ -2724,7 +2725,7 @@
             <a:extLst/>
           </a:lstStyle>
           <a:p>
-            <a:endParaRPr kumimoji="0" lang="en-US"/>
+            <a:endParaRPr kumimoji="0" lang="en-US" dirty="0"/>
           </a:p>
         </p:txBody>
       </p:sp>
@@ -2809,7 +2810,7 @@
             <a:extLst/>
           </a:lstStyle>
           <a:p>
-            <a:endParaRPr kumimoji="0" lang="en-US"/>
+            <a:endParaRPr kumimoji="0" lang="en-US" dirty="0"/>
           </a:p>
         </p:txBody>
       </p:sp>
@@ -2894,7 +2895,7 @@
             <a:extLst/>
           </a:lstStyle>
           <a:p>
-            <a:endParaRPr kumimoji="0" lang="en-US"/>
+            <a:endParaRPr kumimoji="0" lang="en-US" dirty="0"/>
           </a:p>
         </p:txBody>
       </p:sp>
@@ -2979,7 +2980,7 @@
             <a:extLst/>
           </a:lstStyle>
           <a:p>
-            <a:endParaRPr kumimoji="0" lang="en-US"/>
+            <a:endParaRPr kumimoji="0" lang="en-US" dirty="0"/>
           </a:p>
         </p:txBody>
       </p:sp>
@@ -3064,7 +3065,7 @@
             <a:extLst/>
           </a:lstStyle>
           <a:p>
-            <a:endParaRPr kumimoji="0" lang="en-US"/>
+            <a:endParaRPr kumimoji="0" lang="en-US" dirty="0"/>
           </a:p>
         </p:txBody>
       </p:sp>
@@ -3168,9 +3169,9 @@
             <a:fld id="{6D665BB9-288C-4161-8457-CA8B183134BE}" type="datetimeFigureOut">
               <a:rPr lang="pl-PL" smtClean="0"/>
               <a:pPr/>
-              <a:t>2019-01-13</a:t>
+              <a:t>2019-01-14</a:t>
             </a:fld>
-            <a:endParaRPr lang="pl-PL"/>
+            <a:endParaRPr lang="pl-PL" dirty="0"/>
           </a:p>
         </p:txBody>
       </p:sp>
@@ -3191,7 +3192,7 @@
             <a:extLst/>
           </a:lstStyle>
           <a:p>
-            <a:endParaRPr lang="pl-PL"/>
+            <a:endParaRPr lang="pl-PL" dirty="0"/>
           </a:p>
         </p:txBody>
       </p:sp>
@@ -3217,7 +3218,7 @@
               <a:pPr/>
               <a:t>‹#›</a:t>
             </a:fld>
-            <a:endParaRPr lang="pl-PL"/>
+            <a:endParaRPr lang="pl-PL" dirty="0"/>
           </a:p>
         </p:txBody>
       </p:sp>
@@ -3269,7 +3270,7 @@
           </a:lstStyle>
           <a:p>
             <a:pPr algn="ctr" eaLnBrk="1" latinLnBrk="0" hangingPunct="1"/>
-            <a:endParaRPr kumimoji="0" lang="en-US"/>
+            <a:endParaRPr kumimoji="0" lang="en-US" dirty="0"/>
           </a:p>
         </p:txBody>
       </p:sp>
@@ -3447,7 +3448,7 @@
           </a:lstStyle>
           <a:p>
             <a:pPr algn="ctr" eaLnBrk="1" latinLnBrk="0" hangingPunct="1"/>
-            <a:endParaRPr kumimoji="0" lang="en-US"/>
+            <a:endParaRPr kumimoji="0" lang="en-US" dirty="0"/>
           </a:p>
         </p:txBody>
       </p:sp>
@@ -3770,9 +3771,9 @@
             <a:fld id="{6D665BB9-288C-4161-8457-CA8B183134BE}" type="datetimeFigureOut">
               <a:rPr lang="pl-PL" smtClean="0"/>
               <a:pPr/>
-              <a:t>2019-01-13</a:t>
+              <a:t>2019-01-14</a:t>
             </a:fld>
-            <a:endParaRPr lang="pl-PL"/>
+            <a:endParaRPr lang="pl-PL" dirty="0"/>
           </a:p>
         </p:txBody>
       </p:sp>
@@ -3793,7 +3794,7 @@
             <a:extLst/>
           </a:lstStyle>
           <a:p>
-            <a:endParaRPr lang="pl-PL"/>
+            <a:endParaRPr lang="pl-PL" dirty="0"/>
           </a:p>
         </p:txBody>
       </p:sp>
@@ -3819,7 +3820,7 @@
               <a:pPr/>
               <a:t>‹#›</a:t>
             </a:fld>
-            <a:endParaRPr lang="pl-PL"/>
+            <a:endParaRPr lang="pl-PL" dirty="0"/>
           </a:p>
         </p:txBody>
       </p:sp>
@@ -3896,7 +3897,7 @@
           </a:lstStyle>
           <a:p>
             <a:pPr algn="ctr" eaLnBrk="1" latinLnBrk="0" hangingPunct="1"/>
-            <a:endParaRPr kumimoji="0" lang="en-US"/>
+            <a:endParaRPr kumimoji="0" lang="en-US" dirty="0"/>
           </a:p>
         </p:txBody>
       </p:sp>
@@ -4209,9 +4210,9 @@
             <a:fld id="{6D665BB9-288C-4161-8457-CA8B183134BE}" type="datetimeFigureOut">
               <a:rPr lang="pl-PL" smtClean="0"/>
               <a:pPr/>
-              <a:t>2019-01-13</a:t>
+              <a:t>2019-01-14</a:t>
             </a:fld>
-            <a:endParaRPr lang="pl-PL"/>
+            <a:endParaRPr lang="pl-PL" dirty="0"/>
           </a:p>
         </p:txBody>
       </p:sp>
@@ -4232,7 +4233,7 @@
             <a:extLst/>
           </a:lstStyle>
           <a:p>
-            <a:endParaRPr lang="pl-PL"/>
+            <a:endParaRPr lang="pl-PL" dirty="0"/>
           </a:p>
         </p:txBody>
       </p:sp>
@@ -4258,7 +4259,7 @@
               <a:pPr/>
               <a:t>‹#›</a:t>
             </a:fld>
-            <a:endParaRPr lang="pl-PL"/>
+            <a:endParaRPr lang="pl-PL" dirty="0"/>
           </a:p>
         </p:txBody>
       </p:sp>
@@ -4402,7 +4403,7 @@
           </a:lstStyle>
           <a:p>
             <a:pPr algn="ctr" eaLnBrk="1" latinLnBrk="0" hangingPunct="1"/>
-            <a:endParaRPr kumimoji="0" lang="en-US"/>
+            <a:endParaRPr kumimoji="0" lang="en-US" dirty="0"/>
           </a:p>
         </p:txBody>
       </p:sp>
@@ -4594,7 +4595,7 @@
           </a:lstStyle>
           <a:p>
             <a:pPr algn="ctr" eaLnBrk="1" latinLnBrk="0" hangingPunct="1"/>
-            <a:endParaRPr kumimoji="0" lang="en-US"/>
+            <a:endParaRPr kumimoji="0" lang="en-US" dirty="0"/>
           </a:p>
         </p:txBody>
       </p:sp>
@@ -4772,9 +4773,9 @@
             <a:fld id="{6D665BB9-288C-4161-8457-CA8B183134BE}" type="datetimeFigureOut">
               <a:rPr lang="pl-PL" smtClean="0"/>
               <a:pPr/>
-              <a:t>2019-01-13</a:t>
+              <a:t>2019-01-14</a:t>
             </a:fld>
-            <a:endParaRPr lang="pl-PL"/>
+            <a:endParaRPr lang="pl-PL" dirty="0"/>
           </a:p>
         </p:txBody>
       </p:sp>
@@ -4795,7 +4796,7 @@
             <a:extLst/>
           </a:lstStyle>
           <a:p>
-            <a:endParaRPr lang="pl-PL"/>
+            <a:endParaRPr lang="pl-PL" dirty="0"/>
           </a:p>
         </p:txBody>
       </p:sp>
@@ -4821,7 +4822,7 @@
               <a:pPr/>
               <a:t>‹#›</a:t>
             </a:fld>
-            <a:endParaRPr lang="pl-PL"/>
+            <a:endParaRPr lang="pl-PL" dirty="0"/>
           </a:p>
         </p:txBody>
       </p:sp>
@@ -4870,9 +4871,9 @@
             <a:fld id="{6D665BB9-288C-4161-8457-CA8B183134BE}" type="datetimeFigureOut">
               <a:rPr lang="pl-PL" smtClean="0"/>
               <a:pPr/>
-              <a:t>2019-01-13</a:t>
+              <a:t>2019-01-14</a:t>
             </a:fld>
-            <a:endParaRPr lang="pl-PL"/>
+            <a:endParaRPr lang="pl-PL" dirty="0"/>
           </a:p>
         </p:txBody>
       </p:sp>
@@ -4893,7 +4894,7 @@
             <a:extLst/>
           </a:lstStyle>
           <a:p>
-            <a:endParaRPr lang="pl-PL"/>
+            <a:endParaRPr lang="pl-PL" dirty="0"/>
           </a:p>
         </p:txBody>
       </p:sp>
@@ -4919,7 +4920,7 @@
               <a:pPr/>
               <a:t>‹#›</a:t>
             </a:fld>
-            <a:endParaRPr lang="pl-PL"/>
+            <a:endParaRPr lang="pl-PL" dirty="0"/>
           </a:p>
         </p:txBody>
       </p:sp>
@@ -5126,9 +5127,9 @@
             <a:fld id="{6D665BB9-288C-4161-8457-CA8B183134BE}" type="datetimeFigureOut">
               <a:rPr lang="pl-PL" smtClean="0"/>
               <a:pPr/>
-              <a:t>2019-01-13</a:t>
+              <a:t>2019-01-14</a:t>
             </a:fld>
-            <a:endParaRPr lang="pl-PL"/>
+            <a:endParaRPr lang="pl-PL" dirty="0"/>
           </a:p>
         </p:txBody>
       </p:sp>
@@ -5149,7 +5150,7 @@
             <a:extLst/>
           </a:lstStyle>
           <a:p>
-            <a:endParaRPr lang="pl-PL"/>
+            <a:endParaRPr lang="pl-PL" dirty="0"/>
           </a:p>
         </p:txBody>
       </p:sp>
@@ -5175,7 +5176,7 @@
               <a:pPr/>
               <a:t>‹#›</a:t>
             </a:fld>
-            <a:endParaRPr lang="pl-PL"/>
+            <a:endParaRPr lang="pl-PL" dirty="0"/>
           </a:p>
         </p:txBody>
       </p:sp>
@@ -5250,7 +5251,7 @@
           </a:lstStyle>
           <a:p>
             <a:pPr algn="ctr" eaLnBrk="1" latinLnBrk="0" hangingPunct="1"/>
-            <a:endParaRPr kumimoji="0" lang="en-US"/>
+            <a:endParaRPr kumimoji="0" lang="en-US" dirty="0"/>
           </a:p>
         </p:txBody>
       </p:sp>
@@ -5494,10 +5495,10 @@
           </a:lstStyle>
           <a:p>
             <a:r>
-              <a:rPr kumimoji="0" lang="pl-PL" smtClean="0"/>
+              <a:rPr kumimoji="0" lang="pl-PL" dirty="0" smtClean="0"/>
               <a:t>Kliknij ikonę, aby dodać obraz</a:t>
             </a:r>
-            <a:endParaRPr kumimoji="0" lang="en-US"/>
+            <a:endParaRPr kumimoji="0" lang="en-US" dirty="0"/>
           </a:p>
         </p:txBody>
       </p:sp>
@@ -5849,9 +5850,9 @@
             <a:fld id="{6D665BB9-288C-4161-8457-CA8B183134BE}" type="datetimeFigureOut">
               <a:rPr lang="pl-PL" smtClean="0"/>
               <a:pPr/>
-              <a:t>2019-01-13</a:t>
+              <a:t>2019-01-14</a:t>
             </a:fld>
-            <a:endParaRPr lang="pl-PL"/>
+            <a:endParaRPr lang="pl-PL" dirty="0"/>
           </a:p>
         </p:txBody>
       </p:sp>
@@ -5877,7 +5878,7 @@
             <a:extLst/>
           </a:lstStyle>
           <a:p>
-            <a:endParaRPr lang="pl-PL"/>
+            <a:endParaRPr lang="pl-PL" dirty="0"/>
           </a:p>
         </p:txBody>
       </p:sp>
@@ -5908,7 +5909,7 @@
               <a:pPr/>
               <a:t>‹#›</a:t>
             </a:fld>
-            <a:endParaRPr lang="pl-PL"/>
+            <a:endParaRPr lang="pl-PL" dirty="0"/>
           </a:p>
         </p:txBody>
       </p:sp>
@@ -5988,7 +5989,7 @@
           </a:lstStyle>
           <a:p>
             <a:pPr algn="ctr" eaLnBrk="1" latinLnBrk="0" hangingPunct="1"/>
-            <a:endParaRPr kumimoji="0" lang="en-US"/>
+            <a:endParaRPr kumimoji="0" lang="en-US" dirty="0"/>
           </a:p>
         </p:txBody>
       </p:sp>
@@ -6038,7 +6039,7 @@
           </a:lstStyle>
           <a:p>
             <a:pPr algn="ctr" eaLnBrk="1" latinLnBrk="0" hangingPunct="1"/>
-            <a:endParaRPr kumimoji="0" lang="en-US"/>
+            <a:endParaRPr kumimoji="0" lang="en-US" dirty="0"/>
           </a:p>
         </p:txBody>
       </p:sp>
@@ -6088,7 +6089,7 @@
           </a:lstStyle>
           <a:p>
             <a:pPr algn="ctr" eaLnBrk="1" latinLnBrk="0" hangingPunct="1"/>
-            <a:endParaRPr kumimoji="0" lang="en-US"/>
+            <a:endParaRPr kumimoji="0" lang="en-US" dirty="0"/>
           </a:p>
         </p:txBody>
       </p:sp>
@@ -6136,7 +6137,7 @@
           </a:lstStyle>
           <a:p>
             <a:pPr algn="ctr" eaLnBrk="1" latinLnBrk="0" hangingPunct="1"/>
-            <a:endParaRPr kumimoji="0" lang="en-US"/>
+            <a:endParaRPr kumimoji="0" lang="en-US" dirty="0"/>
           </a:p>
         </p:txBody>
       </p:sp>
@@ -6336,7 +6337,7 @@
           </a:lstStyle>
           <a:p>
             <a:pPr algn="ctr" eaLnBrk="1" latinLnBrk="0" hangingPunct="1"/>
-            <a:endParaRPr kumimoji="0" lang="en-US"/>
+            <a:endParaRPr kumimoji="0" lang="en-US" dirty="0"/>
           </a:p>
         </p:txBody>
       </p:sp>
@@ -6524,9 +6525,9 @@
             <a:fld id="{6D665BB9-288C-4161-8457-CA8B183134BE}" type="datetimeFigureOut">
               <a:rPr lang="pl-PL" smtClean="0"/>
               <a:pPr/>
-              <a:t>2019-01-13</a:t>
+              <a:t>2019-01-14</a:t>
             </a:fld>
-            <a:endParaRPr lang="pl-PL"/>
+            <a:endParaRPr lang="pl-PL" dirty="0"/>
           </a:p>
         </p:txBody>
       </p:sp>
@@ -6562,7 +6563,7 @@
             <a:extLst/>
           </a:lstStyle>
           <a:p>
-            <a:endParaRPr lang="pl-PL"/>
+            <a:endParaRPr lang="pl-PL" dirty="0"/>
           </a:p>
         </p:txBody>
       </p:sp>
@@ -6603,7 +6604,7 @@
               <a:pPr/>
               <a:t>‹#›</a:t>
             </a:fld>
-            <a:endParaRPr lang="pl-PL"/>
+            <a:endParaRPr lang="pl-PL" dirty="0"/>
           </a:p>
         </p:txBody>
       </p:sp>
@@ -6940,7 +6941,7 @@
           <a:lstStyle/>
           <a:p>
             <a:r>
-              <a:rPr lang="pl-PL" dirty="0" err="1" smtClean="0"/>
+              <a:rPr lang="pl-PL" dirty="0" smtClean="0"/>
               <a:t>SpecFlow</a:t>
             </a:r>
             <a:r>
@@ -7023,7 +7024,7 @@
           <a:p>
             <a:r>
               <a:rPr lang="pl-PL" dirty="0" smtClean="0"/>
-              <a:t>Parametry i tablice</a:t>
+              <a:t>Kroki</a:t>
             </a:r>
             <a:endParaRPr lang="pl-PL" dirty="0"/>
           </a:p>
@@ -7031,7 +7032,7 @@
       </p:sp>
       <p:pic>
         <p:nvPicPr>
-          <p:cNvPr id="5125" name="Picture 5"/>
+          <p:cNvPr id="4098" name="Picture 2"/>
           <p:cNvPicPr>
             <a:picLocks noGrp="1" noChangeAspect="1" noChangeArrowheads="1"/>
           </p:cNvPicPr>
@@ -7048,8 +7049,8 @@
         </p:blipFill>
         <p:spPr bwMode="auto">
           <a:xfrm>
-            <a:off x="2209800" y="3303587"/>
-            <a:ext cx="5181600" cy="1533525"/>
+            <a:off x="962025" y="3175000"/>
+            <a:ext cx="7677150" cy="1790700"/>
           </a:xfrm>
           <a:prstGeom prst="rect">
             <a:avLst/>
@@ -7112,7 +7113,7 @@
           <a:p>
             <a:r>
               <a:rPr lang="pl-PL" dirty="0" smtClean="0"/>
-              <a:t>Założenia</a:t>
+              <a:t>Parametry i tablice</a:t>
             </a:r>
             <a:endParaRPr lang="pl-PL" dirty="0"/>
           </a:p>
@@ -7120,7 +7121,7 @@
       </p:sp>
       <p:pic>
         <p:nvPicPr>
-          <p:cNvPr id="7170" name="Picture 2"/>
+          <p:cNvPr id="5125" name="Picture 5"/>
           <p:cNvPicPr>
             <a:picLocks noGrp="1" noChangeAspect="1" noChangeArrowheads="1"/>
           </p:cNvPicPr>
@@ -7137,8 +7138,8 @@
         </p:blipFill>
         <p:spPr bwMode="auto">
           <a:xfrm>
-            <a:off x="3052762" y="3732212"/>
-            <a:ext cx="3495675" cy="676275"/>
+            <a:off x="2209800" y="3303587"/>
+            <a:ext cx="5181600" cy="1533525"/>
           </a:xfrm>
           <a:prstGeom prst="rect">
             <a:avLst/>
@@ -7201,41 +7202,46 @@
           <a:p>
             <a:r>
               <a:rPr lang="pl-PL" dirty="0" smtClean="0"/>
-              <a:t>Kontekst</a:t>
+              <a:t>Założenia</a:t>
             </a:r>
             <a:endParaRPr lang="pl-PL" dirty="0"/>
           </a:p>
         </p:txBody>
       </p:sp>
-      <p:sp>
-        <p:nvSpPr>
-          <p:cNvPr id="3" name="Symbol zastępczy zawartości 2"/>
-          <p:cNvSpPr>
-            <a:spLocks noGrp="1"/>
-          </p:cNvSpPr>
+      <p:pic>
+        <p:nvPicPr>
+          <p:cNvPr id="7170" name="Picture 2"/>
+          <p:cNvPicPr>
+            <a:picLocks noGrp="1" noChangeAspect="1" noChangeArrowheads="1"/>
+          </p:cNvPicPr>
           <p:nvPr>
             <p:ph idx="1"/>
           </p:nvPr>
-        </p:nvSpPr>
-        <p:spPr/>
-        <p:txBody>
-          <a:bodyPr/>
-          <a:lstStyle/>
-          <a:p>
-            <a:r>
-              <a:rPr lang="pl-PL" dirty="0" smtClean="0"/>
-              <a:t>Statyczne akcesory</a:t>
-            </a:r>
-          </a:p>
-          <a:p>
-            <a:r>
-              <a:rPr lang="pl-PL" dirty="0" smtClean="0"/>
-              <a:t>DI</a:t>
-            </a:r>
-            <a:endParaRPr lang="pl-PL" dirty="0"/>
-          </a:p>
-        </p:txBody>
-      </p:sp>
+        </p:nvPicPr>
+        <p:blipFill>
+          <a:blip r:embed="rId2" cstate="print"/>
+          <a:srcRect/>
+          <a:stretch>
+            <a:fillRect/>
+          </a:stretch>
+        </p:blipFill>
+        <p:spPr bwMode="auto">
+          <a:xfrm>
+            <a:off x="3052762" y="3732212"/>
+            <a:ext cx="3495675" cy="676275"/>
+          </a:xfrm>
+          <a:prstGeom prst="rect">
+            <a:avLst/>
+          </a:prstGeom>
+          <a:noFill/>
+          <a:ln w="9525">
+            <a:noFill/>
+            <a:miter lim="800000"/>
+            <a:headEnd/>
+            <a:tailEnd/>
+          </a:ln>
+        </p:spPr>
+      </p:pic>
     </p:spTree>
   </p:cSld>
   <p:clrMapOvr>
@@ -7285,7 +7291,7 @@
           <a:p>
             <a:r>
               <a:rPr lang="pl-PL" dirty="0" smtClean="0"/>
-              <a:t>Haki</a:t>
+              <a:t>Kontekst</a:t>
             </a:r>
             <a:endParaRPr lang="pl-PL" dirty="0"/>
           </a:p>
@@ -7308,31 +7314,13 @@
           <a:p>
             <a:r>
               <a:rPr lang="pl-PL" dirty="0" smtClean="0"/>
-              <a:t>Per krok</a:t>
+              <a:t>Statyczne akcesory</a:t>
             </a:r>
           </a:p>
           <a:p>
             <a:r>
               <a:rPr lang="pl-PL" dirty="0" smtClean="0"/>
-              <a:t>Per blok kroków</a:t>
-            </a:r>
-          </a:p>
-          <a:p>
-            <a:r>
-              <a:rPr lang="pl-PL" dirty="0" smtClean="0"/>
-              <a:t>Per scenariusz</a:t>
-            </a:r>
-          </a:p>
-          <a:p>
-            <a:r>
-              <a:rPr lang="pl-PL" dirty="0" smtClean="0"/>
-              <a:t>Per funkcjonalność</a:t>
-            </a:r>
-          </a:p>
-          <a:p>
-            <a:r>
-              <a:rPr lang="pl-PL" dirty="0" smtClean="0"/>
-              <a:t>Per wszystkie testy</a:t>
+              <a:t>DI</a:t>
             </a:r>
             <a:endParaRPr lang="pl-PL" dirty="0"/>
           </a:p>
@@ -7387,46 +7375,59 @@
           <a:p>
             <a:r>
               <a:rPr lang="pl-PL" dirty="0" smtClean="0"/>
-              <a:t>Haki - przykład</a:t>
+              <a:t>Haki</a:t>
             </a:r>
             <a:endParaRPr lang="pl-PL" dirty="0"/>
           </a:p>
         </p:txBody>
       </p:sp>
-      <p:pic>
-        <p:nvPicPr>
-          <p:cNvPr id="6146" name="Picture 2"/>
-          <p:cNvPicPr>
-            <a:picLocks noGrp="1" noChangeAspect="1" noChangeArrowheads="1"/>
-          </p:cNvPicPr>
+      <p:sp>
+        <p:nvSpPr>
+          <p:cNvPr id="3" name="Symbol zastępczy zawartości 2"/>
+          <p:cNvSpPr>
+            <a:spLocks noGrp="1"/>
+          </p:cNvSpPr>
           <p:nvPr>
             <p:ph idx="1"/>
           </p:nvPr>
-        </p:nvPicPr>
-        <p:blipFill>
-          <a:blip r:embed="rId2" cstate="print"/>
-          <a:srcRect/>
-          <a:stretch>
-            <a:fillRect/>
-          </a:stretch>
-        </p:blipFill>
-        <p:spPr bwMode="auto">
-          <a:xfrm>
-            <a:off x="1143000" y="3079750"/>
-            <a:ext cx="7315200" cy="1981200"/>
-          </a:xfrm>
-          <a:prstGeom prst="rect">
-            <a:avLst/>
-          </a:prstGeom>
-          <a:noFill/>
-          <a:ln w="9525">
-            <a:noFill/>
-            <a:miter lim="800000"/>
-            <a:headEnd/>
-            <a:tailEnd/>
-          </a:ln>
-        </p:spPr>
-      </p:pic>
+        </p:nvSpPr>
+        <p:spPr/>
+        <p:txBody>
+          <a:bodyPr/>
+          <a:lstStyle/>
+          <a:p>
+            <a:r>
+              <a:rPr lang="pl-PL" dirty="0" smtClean="0"/>
+              <a:t>Per krok</a:t>
+            </a:r>
+          </a:p>
+          <a:p>
+            <a:r>
+              <a:rPr lang="pl-PL" dirty="0" smtClean="0"/>
+              <a:t>Per blok kroków</a:t>
+            </a:r>
+          </a:p>
+          <a:p>
+            <a:r>
+              <a:rPr lang="pl-PL" dirty="0" smtClean="0"/>
+              <a:t>Per scenariusz</a:t>
+            </a:r>
+          </a:p>
+          <a:p>
+            <a:r>
+              <a:rPr lang="pl-PL" dirty="0" smtClean="0"/>
+              <a:t>Per funkcjonalność</a:t>
+            </a:r>
+          </a:p>
+          <a:p>
+            <a:r>
+              <a:rPr lang="pl-PL" dirty="0" smtClean="0"/>
+              <a:t>Per wszystkie testy</a:t>
+            </a:r>
+            <a:endParaRPr lang="pl-PL" dirty="0"/>
+          </a:p>
+        </p:txBody>
+      </p:sp>
     </p:spTree>
   </p:cSld>
   <p:clrMapOvr>
@@ -7461,12 +7462,12 @@
       </p:grpSpPr>
       <p:sp>
         <p:nvSpPr>
-          <p:cNvPr id="5" name="Symbol zastępczy tekstu 4"/>
-          <p:cNvSpPr>
-            <a:spLocks noGrp="1"/>
-          </p:cNvSpPr>
-          <p:nvPr>
-            <p:ph type="body" idx="1"/>
+          <p:cNvPr id="2" name="Tytuł 1"/>
+          <p:cNvSpPr>
+            <a:spLocks noGrp="1"/>
+          </p:cNvSpPr>
+          <p:nvPr>
+            <p:ph type="title"/>
           </p:nvPr>
         </p:nvSpPr>
         <p:spPr/>
@@ -7474,33 +7475,48 @@
           <a:bodyPr/>
           <a:lstStyle/>
           <a:p>
-            <a:endParaRPr lang="pl-PL"/>
-          </a:p>
-        </p:txBody>
-      </p:sp>
-      <p:sp>
-        <p:nvSpPr>
-          <p:cNvPr id="4" name="Tytuł 3"/>
-          <p:cNvSpPr>
-            <a:spLocks noGrp="1"/>
-          </p:cNvSpPr>
-          <p:nvPr>
-            <p:ph type="title"/>
-          </p:nvPr>
-        </p:nvSpPr>
-        <p:spPr/>
-        <p:txBody>
-          <a:bodyPr/>
-          <a:lstStyle/>
-          <a:p>
             <a:r>
               <a:rPr lang="pl-PL" dirty="0" smtClean="0"/>
-              <a:t>Demo</a:t>
+              <a:t>Haki - przykład</a:t>
             </a:r>
             <a:endParaRPr lang="pl-PL" dirty="0"/>
           </a:p>
         </p:txBody>
       </p:sp>
+      <p:pic>
+        <p:nvPicPr>
+          <p:cNvPr id="6146" name="Picture 2"/>
+          <p:cNvPicPr>
+            <a:picLocks noGrp="1" noChangeAspect="1" noChangeArrowheads="1"/>
+          </p:cNvPicPr>
+          <p:nvPr>
+            <p:ph idx="1"/>
+          </p:nvPr>
+        </p:nvPicPr>
+        <p:blipFill>
+          <a:blip r:embed="rId2" cstate="print"/>
+          <a:srcRect/>
+          <a:stretch>
+            <a:fillRect/>
+          </a:stretch>
+        </p:blipFill>
+        <p:spPr bwMode="auto">
+          <a:xfrm>
+            <a:off x="1143000" y="3079750"/>
+            <a:ext cx="7315200" cy="1981200"/>
+          </a:xfrm>
+          <a:prstGeom prst="rect">
+            <a:avLst/>
+          </a:prstGeom>
+          <a:noFill/>
+          <a:ln w="9525">
+            <a:noFill/>
+            <a:miter lim="800000"/>
+            <a:headEnd/>
+            <a:tailEnd/>
+          </a:ln>
+        </p:spPr>
+      </p:pic>
     </p:spTree>
   </p:cSld>
   <p:clrMapOvr>
@@ -7535,12 +7551,12 @@
       </p:grpSpPr>
       <p:sp>
         <p:nvSpPr>
-          <p:cNvPr id="4" name="Tytuł 3"/>
-          <p:cNvSpPr>
-            <a:spLocks noGrp="1"/>
-          </p:cNvSpPr>
-          <p:nvPr>
-            <p:ph type="title"/>
+          <p:cNvPr id="5" name="Symbol zastępczy tekstu 4"/>
+          <p:cNvSpPr>
+            <a:spLocks noGrp="1"/>
+          </p:cNvSpPr>
+          <p:nvPr>
+            <p:ph type="body" idx="1"/>
           </p:nvPr>
         </p:nvSpPr>
         <p:spPr/>
@@ -7548,80 +7564,33 @@
           <a:bodyPr/>
           <a:lstStyle/>
           <a:p>
+            <a:endParaRPr lang="pl-PL" dirty="0"/>
+          </a:p>
+        </p:txBody>
+      </p:sp>
+      <p:sp>
+        <p:nvSpPr>
+          <p:cNvPr id="4" name="Tytuł 3"/>
+          <p:cNvSpPr>
+            <a:spLocks noGrp="1"/>
+          </p:cNvSpPr>
+          <p:nvPr>
+            <p:ph type="title"/>
+          </p:nvPr>
+        </p:nvSpPr>
+        <p:spPr/>
+        <p:txBody>
+          <a:bodyPr/>
+          <a:lstStyle/>
+          <a:p>
             <a:r>
               <a:rPr lang="pl-PL" dirty="0" smtClean="0"/>
-              <a:t>Integracja z Visual Studio</a:t>
+              <a:t>Demo</a:t>
             </a:r>
             <a:endParaRPr lang="pl-PL" dirty="0"/>
           </a:p>
         </p:txBody>
       </p:sp>
-      <p:pic>
-        <p:nvPicPr>
-          <p:cNvPr id="9218" name="Picture 2"/>
-          <p:cNvPicPr>
-            <a:picLocks noGrp="1" noChangeAspect="1" noChangeArrowheads="1"/>
-          </p:cNvPicPr>
-          <p:nvPr>
-            <p:ph idx="1"/>
-          </p:nvPr>
-        </p:nvPicPr>
-        <p:blipFill>
-          <a:blip r:embed="rId2" cstate="print"/>
-          <a:srcRect/>
-          <a:stretch>
-            <a:fillRect/>
-          </a:stretch>
-        </p:blipFill>
-        <p:spPr bwMode="auto">
-          <a:xfrm>
-            <a:off x="2562225" y="2924944"/>
-            <a:ext cx="4476750" cy="3495675"/>
-          </a:xfrm>
-          <a:prstGeom prst="rect">
-            <a:avLst/>
-          </a:prstGeom>
-          <a:noFill/>
-          <a:ln w="9525">
-            <a:noFill/>
-            <a:miter lim="800000"/>
-            <a:headEnd/>
-            <a:tailEnd/>
-          </a:ln>
-        </p:spPr>
-      </p:pic>
-      <p:pic>
-        <p:nvPicPr>
-          <p:cNvPr id="9220" name="Picture 4"/>
-          <p:cNvPicPr>
-            <a:picLocks noChangeAspect="1" noChangeArrowheads="1"/>
-          </p:cNvPicPr>
-          <p:nvPr/>
-        </p:nvPicPr>
-        <p:blipFill>
-          <a:blip r:embed="rId3" cstate="print"/>
-          <a:srcRect/>
-          <a:stretch>
-            <a:fillRect/>
-          </a:stretch>
-        </p:blipFill>
-        <p:spPr bwMode="auto">
-          <a:xfrm>
-            <a:off x="2771800" y="1700808"/>
-            <a:ext cx="4124325" cy="781050"/>
-          </a:xfrm>
-          <a:prstGeom prst="rect">
-            <a:avLst/>
-          </a:prstGeom>
-          <a:noFill/>
-          <a:ln w="9525">
-            <a:noFill/>
-            <a:miter lim="800000"/>
-            <a:headEnd/>
-            <a:tailEnd/>
-          </a:ln>
-        </p:spPr>
-      </p:pic>
     </p:spTree>
   </p:cSld>
   <p:clrMapOvr>
@@ -7656,7 +7625,7 @@
       </p:grpSpPr>
       <p:sp>
         <p:nvSpPr>
-          <p:cNvPr id="2" name="Tytuł 1"/>
+          <p:cNvPr id="4" name="Tytuł 3"/>
           <p:cNvSpPr>
             <a:spLocks noGrp="1"/>
           </p:cNvSpPr>
@@ -7671,49 +7640,78 @@
           <a:p>
             <a:r>
               <a:rPr lang="pl-PL" dirty="0" smtClean="0"/>
-              <a:t>Jak testy się uruchamiają?</a:t>
+              <a:t>Integracja z Visual Studio</a:t>
             </a:r>
             <a:endParaRPr lang="pl-PL" dirty="0"/>
           </a:p>
         </p:txBody>
       </p:sp>
-      <p:sp>
-        <p:nvSpPr>
-          <p:cNvPr id="3" name="Symbol zastępczy zawartości 2"/>
-          <p:cNvSpPr>
-            <a:spLocks noGrp="1"/>
-          </p:cNvSpPr>
+      <p:pic>
+        <p:nvPicPr>
+          <p:cNvPr id="9218" name="Picture 2"/>
+          <p:cNvPicPr>
+            <a:picLocks noGrp="1" noChangeAspect="1" noChangeArrowheads="1"/>
+          </p:cNvPicPr>
           <p:nvPr>
             <p:ph idx="1"/>
           </p:nvPr>
-        </p:nvSpPr>
-        <p:spPr/>
-        <p:txBody>
-          <a:bodyPr/>
-          <a:lstStyle/>
-          <a:p>
-            <a:r>
-              <a:rPr lang="pl-PL" dirty="0" err="1" smtClean="0"/>
-              <a:t>nUnit</a:t>
-            </a:r>
-            <a:endParaRPr lang="pl-PL" dirty="0" smtClean="0"/>
-          </a:p>
-          <a:p>
-            <a:r>
-              <a:rPr lang="pl-PL" dirty="0" err="1" smtClean="0"/>
-              <a:t>xUnit</a:t>
-            </a:r>
-            <a:endParaRPr lang="pl-PL" dirty="0" smtClean="0"/>
-          </a:p>
-          <a:p>
-            <a:r>
-              <a:rPr lang="pl-PL" dirty="0" err="1" smtClean="0"/>
-              <a:t>msTest</a:t>
-            </a:r>
-            <a:endParaRPr lang="pl-PL" dirty="0" smtClean="0"/>
-          </a:p>
-        </p:txBody>
-      </p:sp>
+        </p:nvPicPr>
+        <p:blipFill>
+          <a:blip r:embed="rId2" cstate="print"/>
+          <a:srcRect/>
+          <a:stretch>
+            <a:fillRect/>
+          </a:stretch>
+        </p:blipFill>
+        <p:spPr bwMode="auto">
+          <a:xfrm>
+            <a:off x="2562225" y="2924944"/>
+            <a:ext cx="4476750" cy="3495675"/>
+          </a:xfrm>
+          <a:prstGeom prst="rect">
+            <a:avLst/>
+          </a:prstGeom>
+          <a:noFill/>
+          <a:ln w="9525">
+            <a:noFill/>
+            <a:miter lim="800000"/>
+            <a:headEnd/>
+            <a:tailEnd/>
+          </a:ln>
+        </p:spPr>
+      </p:pic>
+      <p:pic>
+        <p:nvPicPr>
+          <p:cNvPr id="9220" name="Picture 4"/>
+          <p:cNvPicPr>
+            <a:picLocks noChangeAspect="1" noChangeArrowheads="1"/>
+          </p:cNvPicPr>
+          <p:nvPr/>
+        </p:nvPicPr>
+        <p:blipFill>
+          <a:blip r:embed="rId3" cstate="print"/>
+          <a:srcRect/>
+          <a:stretch>
+            <a:fillRect/>
+          </a:stretch>
+        </p:blipFill>
+        <p:spPr bwMode="auto">
+          <a:xfrm>
+            <a:off x="2771800" y="1700808"/>
+            <a:ext cx="4124325" cy="781050"/>
+          </a:xfrm>
+          <a:prstGeom prst="rect">
+            <a:avLst/>
+          </a:prstGeom>
+          <a:noFill/>
+          <a:ln w="9525">
+            <a:noFill/>
+            <a:miter lim="800000"/>
+            <a:headEnd/>
+            <a:tailEnd/>
+          </a:ln>
+        </p:spPr>
+      </p:pic>
     </p:spTree>
   </p:cSld>
   <p:clrMapOvr>
@@ -7763,46 +7761,49 @@
           <a:p>
             <a:r>
               <a:rPr lang="pl-PL" dirty="0" smtClean="0"/>
-              <a:t>Lokalizacja</a:t>
+              <a:t>Jak testy się uruchamiają?</a:t>
             </a:r>
             <a:endParaRPr lang="pl-PL" dirty="0"/>
           </a:p>
         </p:txBody>
       </p:sp>
-      <p:pic>
-        <p:nvPicPr>
-          <p:cNvPr id="8194" name="Picture 2"/>
-          <p:cNvPicPr>
-            <a:picLocks noGrp="1" noChangeAspect="1" noChangeArrowheads="1"/>
-          </p:cNvPicPr>
+      <p:sp>
+        <p:nvSpPr>
+          <p:cNvPr id="3" name="Symbol zastępczy zawartości 2"/>
+          <p:cNvSpPr>
+            <a:spLocks noGrp="1"/>
+          </p:cNvSpPr>
           <p:nvPr>
             <p:ph idx="1"/>
           </p:nvPr>
-        </p:nvPicPr>
-        <p:blipFill>
-          <a:blip r:embed="rId2" cstate="print"/>
-          <a:srcRect/>
-          <a:stretch>
-            <a:fillRect/>
-          </a:stretch>
-        </p:blipFill>
-        <p:spPr bwMode="auto">
-          <a:xfrm>
-            <a:off x="2466975" y="2746375"/>
-            <a:ext cx="4667250" cy="2647950"/>
-          </a:xfrm>
-          <a:prstGeom prst="rect">
-            <a:avLst/>
-          </a:prstGeom>
-          <a:noFill/>
-          <a:ln w="9525">
-            <a:noFill/>
-            <a:miter lim="800000"/>
-            <a:headEnd/>
-            <a:tailEnd/>
-          </a:ln>
-        </p:spPr>
-      </p:pic>
+        </p:nvSpPr>
+        <p:spPr/>
+        <p:txBody>
+          <a:bodyPr/>
+          <a:lstStyle/>
+          <a:p>
+            <a:r>
+              <a:rPr lang="pl-PL" dirty="0" smtClean="0"/>
+              <a:t>nUnit</a:t>
+            </a:r>
+            <a:endParaRPr lang="pl-PL" dirty="0" smtClean="0"/>
+          </a:p>
+          <a:p>
+            <a:r>
+              <a:rPr lang="pl-PL" dirty="0" smtClean="0"/>
+              <a:t>xUnit</a:t>
+            </a:r>
+            <a:endParaRPr lang="pl-PL" dirty="0" smtClean="0"/>
+          </a:p>
+          <a:p>
+            <a:r>
+              <a:rPr lang="pl-PL" dirty="0" smtClean="0"/>
+              <a:t>msTest</a:t>
+            </a:r>
+            <a:endParaRPr lang="pl-PL" dirty="0" smtClean="0"/>
+          </a:p>
+        </p:txBody>
+      </p:sp>
     </p:spTree>
   </p:cSld>
   <p:clrMapOvr>
@@ -7851,70 +7852,47 @@
           <a:lstStyle/>
           <a:p>
             <a:r>
-              <a:rPr lang="pl-PL" dirty="0" err="1" smtClean="0"/>
-              <a:t>Pozostałę</a:t>
-            </a:r>
-            <a:r>
               <a:rPr lang="pl-PL" dirty="0" smtClean="0"/>
-              <a:t> możliwości</a:t>
+              <a:t>Lokalizacja</a:t>
             </a:r>
             <a:endParaRPr lang="pl-PL" dirty="0"/>
           </a:p>
         </p:txBody>
       </p:sp>
-      <p:sp>
-        <p:nvSpPr>
-          <p:cNvPr id="3" name="Symbol zastępczy zawartości 2"/>
-          <p:cNvSpPr>
-            <a:spLocks noGrp="1"/>
-          </p:cNvSpPr>
+      <p:pic>
+        <p:nvPicPr>
+          <p:cNvPr id="8194" name="Picture 2"/>
+          <p:cNvPicPr>
+            <a:picLocks noGrp="1" noChangeAspect="1" noChangeArrowheads="1"/>
+          </p:cNvPicPr>
           <p:nvPr>
             <p:ph idx="1"/>
           </p:nvPr>
-        </p:nvSpPr>
-        <p:spPr/>
-        <p:txBody>
-          <a:bodyPr/>
-          <a:lstStyle/>
-          <a:p>
-            <a:r>
-              <a:rPr lang="pl-PL" dirty="0" smtClean="0"/>
-              <a:t>Podłączenie własnego DI</a:t>
-            </a:r>
-            <a:endParaRPr lang="pl-PL" dirty="0" smtClean="0"/>
-          </a:p>
-          <a:p>
-            <a:r>
-              <a:rPr lang="pl-PL" dirty="0" smtClean="0"/>
-              <a:t>Konwersje argumentów</a:t>
-            </a:r>
-          </a:p>
-          <a:p>
-            <a:r>
-              <a:rPr lang="pl-PL" dirty="0" smtClean="0"/>
-              <a:t>Wtyczki</a:t>
-            </a:r>
-          </a:p>
-          <a:p>
-            <a:r>
-              <a:rPr lang="pl-PL" dirty="0" smtClean="0"/>
-              <a:t>„Przestarzałe” </a:t>
-            </a:r>
-            <a:r>
-              <a:rPr lang="pl-PL" dirty="0" smtClean="0"/>
-              <a:t>kroki</a:t>
-            </a:r>
-            <a:endParaRPr lang="pl-PL" dirty="0" smtClean="0"/>
-          </a:p>
-          <a:p>
-            <a:r>
-              <a:rPr lang="pl-PL" dirty="0" smtClean="0"/>
-              <a:t>F#</a:t>
-            </a:r>
-            <a:endParaRPr lang="pl-PL" dirty="0"/>
-          </a:p>
-        </p:txBody>
-      </p:sp>
+        </p:nvPicPr>
+        <p:blipFill>
+          <a:blip r:embed="rId2" cstate="print"/>
+          <a:srcRect/>
+          <a:stretch>
+            <a:fillRect/>
+          </a:stretch>
+        </p:blipFill>
+        <p:spPr bwMode="auto">
+          <a:xfrm>
+            <a:off x="2466975" y="2746375"/>
+            <a:ext cx="4667250" cy="2647950"/>
+          </a:xfrm>
+          <a:prstGeom prst="rect">
+            <a:avLst/>
+          </a:prstGeom>
+          <a:noFill/>
+          <a:ln w="9525">
+            <a:noFill/>
+            <a:miter lim="800000"/>
+            <a:headEnd/>
+            <a:tailEnd/>
+          </a:ln>
+        </p:spPr>
+      </p:pic>
     </p:spTree>
   </p:cSld>
   <p:clrMapOvr>
@@ -8005,7 +7983,7 @@
               <a:t>Obecnie pracuję w firmie </a:t>
             </a:r>
             <a:r>
-              <a:rPr lang="pl-PL" dirty="0" err="1" smtClean="0"/>
+              <a:rPr lang="pl-PL" dirty="0" smtClean="0"/>
               <a:t>Titian</a:t>
             </a:r>
             <a:r>
@@ -8096,15 +8074,11 @@
           <a:p>
             <a:r>
               <a:rPr lang="pl-PL" dirty="0" smtClean="0"/>
-              <a:t>.NET </a:t>
-            </a:r>
-            <a:r>
-              <a:rPr lang="pl-PL" dirty="0" err="1" smtClean="0"/>
-              <a:t>Core</a:t>
+              <a:t>Pozostałe </a:t>
             </a:r>
             <a:r>
               <a:rPr lang="pl-PL" dirty="0" smtClean="0"/>
-              <a:t>?</a:t>
+              <a:t>możliwości</a:t>
             </a:r>
             <a:endParaRPr lang="pl-PL" dirty="0"/>
           </a:p>
@@ -8127,13 +8101,31 @@
           <a:p>
             <a:r>
               <a:rPr lang="pl-PL" dirty="0" smtClean="0"/>
-              <a:t>Niestety jeszcze nie</a:t>
+              <a:t>Podłączenie własnego DI</a:t>
             </a:r>
           </a:p>
           <a:p>
             <a:r>
               <a:rPr lang="pl-PL" dirty="0" smtClean="0"/>
-              <a:t>Ale prace są na ukończeniu</a:t>
+              <a:t>Konwersje argumentów</a:t>
+            </a:r>
+          </a:p>
+          <a:p>
+            <a:r>
+              <a:rPr lang="pl-PL" dirty="0" smtClean="0"/>
+              <a:t>Wtyczki</a:t>
+            </a:r>
+          </a:p>
+          <a:p>
+            <a:r>
+              <a:rPr lang="pl-PL" dirty="0" smtClean="0"/>
+              <a:t>„Przestarzałe” kroki</a:t>
+            </a:r>
+          </a:p>
+          <a:p>
+            <a:r>
+              <a:rPr lang="pl-PL" dirty="0" smtClean="0"/>
+              <a:t>F#</a:t>
             </a:r>
             <a:endParaRPr lang="pl-PL" dirty="0"/>
           </a:p>
@@ -8187,16 +8179,16 @@
           <a:lstStyle/>
           <a:p>
             <a:r>
-              <a:rPr lang="pl-PL" dirty="0" err="1" smtClean="0"/>
-              <a:t>Open</a:t>
-            </a:r>
-            <a:r>
               <a:rPr lang="pl-PL" dirty="0" smtClean="0"/>
-              <a:t> </a:t>
-            </a:r>
-            <a:r>
-              <a:rPr lang="pl-PL" dirty="0" err="1" smtClean="0"/>
-              <a:t>Source</a:t>
+              <a:t>.NET </a:t>
+            </a:r>
+            <a:r>
+              <a:rPr lang="pl-PL" dirty="0" smtClean="0"/>
+              <a:t>Core</a:t>
+            </a:r>
+            <a:r>
+              <a:rPr lang="pl-PL" dirty="0" smtClean="0"/>
+              <a:t>?</a:t>
             </a:r>
             <a:endParaRPr lang="pl-PL" dirty="0"/>
           </a:p>
@@ -8217,75 +8209,20 @@
           <a:bodyPr/>
           <a:lstStyle/>
           <a:p>
-            <a:pPr>
-              <a:buNone/>
-            </a:pPr>
-            <a:r>
-              <a:rPr lang="pl-PL" dirty="0" smtClean="0">
-                <a:hlinkClick r:id="rId2"/>
-              </a:rPr>
-              <a:t>https://github.com/techtalk/SpecFlow</a:t>
-            </a:r>
-            <a:endParaRPr lang="pl-PL" dirty="0" smtClean="0"/>
-          </a:p>
-          <a:p>
-            <a:pPr>
-              <a:buNone/>
-            </a:pPr>
-            <a:endParaRPr lang="pl-PL" dirty="0" smtClean="0"/>
-          </a:p>
-          <a:p>
-            <a:pPr>
-              <a:buNone/>
-            </a:pPr>
-            <a:endParaRPr lang="pl-PL" dirty="0" smtClean="0"/>
-          </a:p>
-          <a:p>
-            <a:pPr>
-              <a:buNone/>
-            </a:pPr>
-            <a:endParaRPr lang="pl-PL" dirty="0" smtClean="0"/>
-          </a:p>
-          <a:p>
-            <a:pPr>
-              <a:buNone/>
-            </a:pPr>
+            <a:r>
+              <a:rPr lang="pl-PL" dirty="0" smtClean="0"/>
+              <a:t>Niestety jeszcze nie</a:t>
+            </a:r>
+          </a:p>
+          <a:p>
+            <a:r>
+              <a:rPr lang="pl-PL" dirty="0" smtClean="0"/>
+              <a:t>Ale prace są na ukończeniu</a:t>
+            </a:r>
             <a:endParaRPr lang="pl-PL" dirty="0"/>
           </a:p>
         </p:txBody>
       </p:sp>
-      <p:pic>
-        <p:nvPicPr>
-          <p:cNvPr id="1028" name="Picture 4"/>
-          <p:cNvPicPr>
-            <a:picLocks noChangeAspect="1" noChangeArrowheads="1"/>
-          </p:cNvPicPr>
-          <p:nvPr/>
-        </p:nvPicPr>
-        <p:blipFill>
-          <a:blip r:embed="rId3" cstate="print"/>
-          <a:srcRect/>
-          <a:stretch>
-            <a:fillRect/>
-          </a:stretch>
-        </p:blipFill>
-        <p:spPr bwMode="auto">
-          <a:xfrm>
-            <a:off x="539552" y="2636912"/>
-            <a:ext cx="8443416" cy="3816424"/>
-          </a:xfrm>
-          <a:prstGeom prst="rect">
-            <a:avLst/>
-          </a:prstGeom>
-          <a:noFill/>
-          <a:ln w="9525">
-            <a:noFill/>
-            <a:miter lim="800000"/>
-            <a:headEnd/>
-            <a:tailEnd/>
-          </a:ln>
-        </p:spPr>
-      </p:pic>
     </p:spTree>
   </p:cSld>
   <p:clrMapOvr>
@@ -8320,73 +8257,131 @@
       </p:grpSpPr>
       <p:sp>
         <p:nvSpPr>
-          <p:cNvPr id="5" name="Symbol zastępczy tekstu 4"/>
-          <p:cNvSpPr>
-            <a:spLocks noGrp="1"/>
-          </p:cNvSpPr>
-          <p:nvPr>
-            <p:ph type="body" idx="1"/>
+          <p:cNvPr id="2" name="Tytuł 1"/>
+          <p:cNvSpPr>
+            <a:spLocks noGrp="1"/>
+          </p:cNvSpPr>
+          <p:nvPr>
+            <p:ph type="title"/>
           </p:nvPr>
         </p:nvSpPr>
         <p:spPr/>
         <p:txBody>
-          <a:bodyPr>
-            <a:normAutofit fontScale="92500"/>
-          </a:bodyPr>
+          <a:bodyPr/>
           <a:lstStyle/>
           <a:p>
             <a:r>
               <a:rPr lang="pl-PL" dirty="0" smtClean="0"/>
-              <a:t>Prezentację i kod źródłowy można znaleźć na </a:t>
-            </a:r>
-            <a:r>
-              <a:rPr lang="pl-PL" dirty="0" err="1" smtClean="0"/>
-              <a:t>GitHubie</a:t>
-            </a:r>
-            <a:endParaRPr lang="pl-PL" dirty="0" smtClean="0"/>
-          </a:p>
-          <a:p>
+              <a:t>Open</a:t>
+            </a:r>
+            <a:r>
+              <a:rPr lang="pl-PL" dirty="0" smtClean="0"/>
+              <a:t> </a:t>
+            </a:r>
+            <a:r>
+              <a:rPr lang="pl-PL" dirty="0" smtClean="0"/>
+              <a:t>Source</a:t>
+            </a:r>
+            <a:endParaRPr lang="pl-PL" dirty="0"/>
+          </a:p>
+        </p:txBody>
+      </p:sp>
+      <p:sp>
+        <p:nvSpPr>
+          <p:cNvPr id="3" name="Symbol zastępczy zawartości 2"/>
+          <p:cNvSpPr>
+            <a:spLocks noGrp="1"/>
+          </p:cNvSpPr>
+          <p:nvPr>
+            <p:ph idx="1"/>
+          </p:nvPr>
+        </p:nvSpPr>
+        <p:spPr/>
+        <p:txBody>
+          <a:bodyPr/>
+          <a:lstStyle/>
+          <a:p>
+            <a:pPr>
+              <a:buNone/>
+            </a:pPr>
             <a:r>
               <a:rPr lang="pl-PL" dirty="0" smtClean="0">
                 <a:hlinkClick r:id="rId2"/>
               </a:rPr>
-              <a:t>https://github.com/melchiork/SpecFlow-Introduction</a:t>
+              <a:t>https://github.com/techtalk/SpecFlow</a:t>
             </a:r>
             <a:endParaRPr lang="pl-PL" dirty="0" smtClean="0"/>
           </a:p>
           <a:p>
+            <a:pPr>
+              <a:buNone/>
+            </a:pPr>
+            <a:endParaRPr lang="pl-PL" dirty="0" smtClean="0"/>
+          </a:p>
+          <a:p>
+            <a:pPr>
+              <a:buNone/>
+            </a:pPr>
+            <a:endParaRPr lang="pl-PL" dirty="0" smtClean="0"/>
+          </a:p>
+          <a:p>
+            <a:pPr>
+              <a:buNone/>
+            </a:pPr>
+            <a:endParaRPr lang="pl-PL" dirty="0" smtClean="0"/>
+          </a:p>
+          <a:p>
+            <a:pPr>
+              <a:buNone/>
+            </a:pPr>
             <a:endParaRPr lang="pl-PL" dirty="0"/>
           </a:p>
         </p:txBody>
       </p:sp>
-      <p:sp>
-        <p:nvSpPr>
-          <p:cNvPr id="4" name="Tytuł 3"/>
-          <p:cNvSpPr>
-            <a:spLocks noGrp="1"/>
-          </p:cNvSpPr>
-          <p:nvPr>
-            <p:ph type="title"/>
-          </p:nvPr>
-        </p:nvSpPr>
-        <p:spPr/>
-        <p:txBody>
-          <a:bodyPr/>
-          <a:lstStyle/>
-          <a:p>
-            <a:r>
-              <a:rPr lang="pl-PL" dirty="0" smtClean="0"/>
-              <a:t>Pytania?</a:t>
-            </a:r>
-            <a:endParaRPr lang="pl-PL" dirty="0"/>
-          </a:p>
-        </p:txBody>
-      </p:sp>
+      <p:pic>
+        <p:nvPicPr>
+          <p:cNvPr id="1028" name="Picture 4"/>
+          <p:cNvPicPr>
+            <a:picLocks noChangeAspect="1" noChangeArrowheads="1"/>
+          </p:cNvPicPr>
+          <p:nvPr/>
+        </p:nvPicPr>
+        <p:blipFill>
+          <a:blip r:embed="rId3" cstate="print"/>
+          <a:srcRect/>
+          <a:stretch>
+            <a:fillRect/>
+          </a:stretch>
+        </p:blipFill>
+        <p:spPr bwMode="auto">
+          <a:xfrm>
+            <a:off x="539552" y="2636912"/>
+            <a:ext cx="8443416" cy="3816424"/>
+          </a:xfrm>
+          <a:prstGeom prst="rect">
+            <a:avLst/>
+          </a:prstGeom>
+          <a:noFill/>
+          <a:ln w="9525">
+            <a:noFill/>
+            <a:miter lim="800000"/>
+            <a:headEnd/>
+            <a:tailEnd/>
+          </a:ln>
+        </p:spPr>
+      </p:pic>
     </p:spTree>
   </p:cSld>
   <p:clrMapOvr>
     <a:masterClrMapping/>
   </p:clrMapOvr>
+  <p:timing>
+    <p:tnLst>
+      <p:par>
+        <p:cTn id="1" dur="indefinite" restart="never" nodeType="tmRoot"/>
+      </p:par>
+    </p:tnLst>
+  </p:timing>
 </p:sld>
 </file>
 
@@ -8409,12 +8404,53 @@
       </p:grpSpPr>
       <p:sp>
         <p:nvSpPr>
+          <p:cNvPr id="5" name="Symbol zastępczy tekstu 4"/>
+          <p:cNvSpPr>
+            <a:spLocks noGrp="1"/>
+          </p:cNvSpPr>
+          <p:nvPr>
+            <p:ph type="body" idx="1"/>
+          </p:nvPr>
+        </p:nvSpPr>
+        <p:spPr/>
+        <p:txBody>
+          <a:bodyPr>
+            <a:normAutofit fontScale="92500"/>
+          </a:bodyPr>
+          <a:lstStyle/>
+          <a:p>
+            <a:r>
+              <a:rPr lang="pl-PL" dirty="0" smtClean="0"/>
+              <a:t>Prezentację i kod źródłowy można znaleźć na </a:t>
+            </a:r>
+            <a:r>
+              <a:rPr lang="pl-PL" dirty="0" smtClean="0"/>
+              <a:t>GitHubie</a:t>
+            </a:r>
+            <a:endParaRPr lang="pl-PL" dirty="0" smtClean="0"/>
+          </a:p>
+          <a:p>
+            <a:r>
+              <a:rPr lang="pl-PL" dirty="0" smtClean="0">
+                <a:hlinkClick r:id="rId2"/>
+              </a:rPr>
+              <a:t>https://github.com/melchiork/SpecFlow-Introduction</a:t>
+            </a:r>
+            <a:endParaRPr lang="pl-PL" dirty="0" smtClean="0"/>
+          </a:p>
+          <a:p>
+            <a:endParaRPr lang="pl-PL" dirty="0"/>
+          </a:p>
+        </p:txBody>
+      </p:sp>
+      <p:sp>
+        <p:nvSpPr>
           <p:cNvPr id="4" name="Tytuł 3"/>
           <p:cNvSpPr>
             <a:spLocks noGrp="1"/>
           </p:cNvSpPr>
           <p:nvPr>
-            <p:ph type="ctrTitle"/>
+            <p:ph type="title"/>
           </p:nvPr>
         </p:nvSpPr>
         <p:spPr/>
@@ -8424,20 +8460,45 @@
           <a:p>
             <a:r>
               <a:rPr lang="pl-PL" dirty="0" smtClean="0"/>
-              <a:t>Dziękuję za uwagę</a:t>
+              <a:t>Pytania?</a:t>
             </a:r>
             <a:endParaRPr lang="pl-PL" dirty="0"/>
           </a:p>
         </p:txBody>
       </p:sp>
-      <p:sp>
-        <p:nvSpPr>
-          <p:cNvPr id="5" name="Podtytuł 4"/>
-          <p:cNvSpPr>
-            <a:spLocks noGrp="1"/>
-          </p:cNvSpPr>
-          <p:nvPr>
-            <p:ph type="subTitle" idx="1"/>
+    </p:spTree>
+  </p:cSld>
+  <p:clrMapOvr>
+    <a:masterClrMapping/>
+  </p:clrMapOvr>
+</p:sld>
+</file>
+
+<file path=ppt/slides/slide24.xml><?xml version="1.0" encoding="utf-8"?>
+<p:sld xmlns:a="http://schemas.openxmlformats.org/drawingml/2006/main" xmlns:r="http://schemas.openxmlformats.org/officeDocument/2006/relationships" xmlns:p="http://schemas.openxmlformats.org/presentationml/2006/main">
+  <p:cSld>
+    <p:spTree>
+      <p:nvGrpSpPr>
+        <p:cNvPr id="1" name=""/>
+        <p:cNvGrpSpPr/>
+        <p:nvPr/>
+      </p:nvGrpSpPr>
+      <p:grpSpPr>
+        <a:xfrm>
+          <a:off x="0" y="0"/>
+          <a:ext cx="0" cy="0"/>
+          <a:chOff x="0" y="0"/>
+          <a:chExt cx="0" cy="0"/>
+        </a:xfrm>
+      </p:grpSpPr>
+      <p:sp>
+        <p:nvSpPr>
+          <p:cNvPr id="4" name="Tytuł 3"/>
+          <p:cNvSpPr>
+            <a:spLocks noGrp="1"/>
+          </p:cNvSpPr>
+          <p:nvPr>
+            <p:ph type="ctrTitle"/>
           </p:nvPr>
         </p:nvSpPr>
         <p:spPr/>
@@ -8445,7 +8506,30 @@
           <a:bodyPr/>
           <a:lstStyle/>
           <a:p>
-            <a:endParaRPr lang="pl-PL"/>
+            <a:r>
+              <a:rPr lang="pl-PL" dirty="0" smtClean="0"/>
+              <a:t>Dziękuję za uwagę</a:t>
+            </a:r>
+            <a:endParaRPr lang="pl-PL" dirty="0"/>
+          </a:p>
+        </p:txBody>
+      </p:sp>
+      <p:sp>
+        <p:nvSpPr>
+          <p:cNvPr id="5" name="Podtytuł 4"/>
+          <p:cNvSpPr>
+            <a:spLocks noGrp="1"/>
+          </p:cNvSpPr>
+          <p:nvPr>
+            <p:ph type="subTitle" idx="1"/>
+          </p:nvPr>
+        </p:nvSpPr>
+        <p:spPr/>
+        <p:txBody>
+          <a:bodyPr/>
+          <a:lstStyle/>
+          <a:p>
+            <a:endParaRPr lang="pl-PL" dirty="0"/>
           </a:p>
         </p:txBody>
       </p:sp>
@@ -8513,7 +8597,7 @@
           <a:lstStyle/>
           <a:p>
             <a:r>
-              <a:rPr lang="pl-PL" dirty="0" err="1" smtClean="0"/>
+              <a:rPr lang="pl-PL" dirty="0" smtClean="0"/>
               <a:t>Behavior-Driven</a:t>
             </a:r>
             <a:r>
@@ -8584,8 +8668,8 @@
           <a:lstStyle/>
           <a:p>
             <a:r>
-              <a:rPr lang="pl-PL" dirty="0" err="1" smtClean="0"/>
-              <a:t>Gerkhin</a:t>
+              <a:rPr lang="pl-PL" dirty="0" smtClean="0"/>
+              <a:t>Gherkin</a:t>
             </a:r>
             <a:endParaRPr lang="pl-PL" dirty="0"/>
           </a:p>
@@ -8610,25 +8694,20 @@
               <a:buNone/>
             </a:pPr>
             <a:r>
-              <a:rPr lang="pl-PL" b="1" dirty="0" err="1" smtClean="0"/>
+              <a:rPr lang="pl-PL" b="1" dirty="0" smtClean="0"/>
               <a:t>Given</a:t>
             </a:r>
             <a:r>
               <a:rPr lang="pl-PL" dirty="0" smtClean="0"/>
-              <a:t> wymagania wstępne są </a:t>
-            </a:r>
-            <a:r>
-              <a:rPr lang="pl-PL" dirty="0" smtClean="0"/>
-              <a:t>ustalone</a:t>
-            </a:r>
-            <a:endParaRPr lang="pl-PL" dirty="0" smtClean="0"/>
+              <a:t> wymagania wstępne są ustalone</a:t>
+            </a:r>
           </a:p>
           <a:p>
             <a:pPr>
               <a:buNone/>
             </a:pPr>
             <a:r>
-              <a:rPr lang="pl-PL" b="1" dirty="0" err="1" smtClean="0"/>
+              <a:rPr lang="pl-PL" b="1" dirty="0" smtClean="0"/>
               <a:t>When</a:t>
             </a:r>
             <a:r>
@@ -8641,7 +8720,7 @@
               <a:buNone/>
             </a:pPr>
             <a:r>
-              <a:rPr lang="pl-PL" b="1" dirty="0" err="1" smtClean="0"/>
+              <a:rPr lang="pl-PL" b="1" dirty="0" smtClean="0"/>
               <a:t>Then</a:t>
             </a:r>
             <a:r>
@@ -8700,7 +8779,7 @@
           <a:lstStyle/>
           <a:p>
             <a:r>
-              <a:rPr lang="pl-PL" dirty="0" err="1" smtClean="0"/>
+              <a:rPr lang="pl-PL" dirty="0" smtClean="0"/>
               <a:t>Gherkin</a:t>
             </a:r>
             <a:r>
@@ -8708,7 +8787,7 @@
               <a:t> – przykład: </a:t>
             </a:r>
             <a:r>
-              <a:rPr lang="pl-PL" dirty="0" err="1" smtClean="0"/>
+              <a:rPr lang="pl-PL" dirty="0" smtClean="0"/>
               <a:t>blog</a:t>
             </a:r>
             <a:endParaRPr lang="pl-PL" dirty="0"/>
@@ -8734,7 +8813,7 @@
               <a:buNone/>
             </a:pPr>
             <a:r>
-              <a:rPr lang="pl-PL" b="1" dirty="0" err="1" smtClean="0"/>
+              <a:rPr lang="pl-PL" b="1" dirty="0" smtClean="0"/>
               <a:t>Given</a:t>
             </a:r>
             <a:r>
@@ -8763,7 +8842,7 @@
               <a:t> jestem zalogowany jako </a:t>
             </a:r>
             <a:r>
-              <a:rPr lang="pl-PL" i="1" dirty="0" err="1" smtClean="0">
+              <a:rPr lang="pl-PL" i="1" dirty="0" smtClean="0">
                 <a:solidFill>
                   <a:schemeClr val="bg2"/>
                 </a:solidFill>
@@ -8781,16 +8860,12 @@
               <a:buNone/>
             </a:pPr>
             <a:r>
-              <a:rPr lang="pl-PL" b="1" dirty="0" err="1" smtClean="0"/>
+              <a:rPr lang="pl-PL" b="1" dirty="0" smtClean="0"/>
               <a:t>When</a:t>
             </a:r>
             <a:r>
               <a:rPr lang="pl-PL" dirty="0" smtClean="0"/>
-              <a:t> promuję </a:t>
-            </a:r>
-            <a:r>
-              <a:rPr lang="pl-PL" dirty="0" smtClean="0"/>
-              <a:t>artykuł o tytule </a:t>
+              <a:t> promuję artykuł o tytule </a:t>
             </a:r>
             <a:r>
               <a:rPr lang="pl-PL" i="1" dirty="0" smtClean="0">
@@ -8800,18 +8875,13 @@
               </a:rPr>
               <a:t>BDD</a:t>
             </a:r>
-            <a:endParaRPr lang="pl-PL" i="1" dirty="0" smtClean="0">
-              <a:solidFill>
-                <a:schemeClr val="bg2"/>
-              </a:solidFill>
-            </a:endParaRPr>
           </a:p>
           <a:p>
             <a:pPr>
               <a:buNone/>
             </a:pPr>
             <a:r>
-              <a:rPr lang="pl-PL" b="1" dirty="0" err="1" smtClean="0"/>
+              <a:rPr lang="pl-PL" b="1" dirty="0" smtClean="0"/>
               <a:t>Then</a:t>
             </a:r>
             <a:r>
@@ -8828,13 +8898,8 @@
             </a:r>
             <a:r>
               <a:rPr lang="pl-PL" dirty="0" smtClean="0"/>
-              <a:t> jest </a:t>
-            </a:r>
-            <a:r>
-              <a:rPr lang="pl-PL" dirty="0" smtClean="0"/>
-              <a:t>na stronie głównej</a:t>
-            </a:r>
-            <a:endParaRPr lang="pl-PL" dirty="0" smtClean="0"/>
+              <a:t> jest na stronie głównej</a:t>
+            </a:r>
           </a:p>
           <a:p>
             <a:pPr>
@@ -8960,64 +9025,46 @@
           <a:lstStyle/>
           <a:p>
             <a:r>
-              <a:rPr lang="pl-PL" dirty="0" err="1" smtClean="0"/>
-              <a:t>SpecFlow</a:t>
+              <a:rPr lang="pl-PL" dirty="0" smtClean="0"/>
+              <a:t>Przykładowa architektura</a:t>
             </a:r>
             <a:endParaRPr lang="pl-PL" dirty="0"/>
           </a:p>
         </p:txBody>
       </p:sp>
-      <p:sp>
-        <p:nvSpPr>
-          <p:cNvPr id="3" name="Symbol zastępczy zawartości 2"/>
-          <p:cNvSpPr>
-            <a:spLocks noGrp="1"/>
-          </p:cNvSpPr>
+      <p:pic>
+        <p:nvPicPr>
+          <p:cNvPr id="9" name="Picture 4" descr="D:\Downloads\test_arch_1.png"/>
+          <p:cNvPicPr>
+            <a:picLocks noGrp="1" noChangeAspect="1" noChangeArrowheads="1"/>
+          </p:cNvPicPr>
           <p:nvPr>
             <p:ph idx="1"/>
           </p:nvPr>
-        </p:nvSpPr>
-        <p:spPr/>
-        <p:txBody>
-          <a:bodyPr/>
-          <a:lstStyle/>
-          <a:p>
-            <a:r>
-              <a:rPr lang="pl-PL" dirty="0" smtClean="0"/>
-              <a:t>Framework do pisania testów BDD</a:t>
-            </a:r>
-          </a:p>
-          <a:p>
-            <a:r>
-              <a:rPr lang="pl-PL" dirty="0" smtClean="0"/>
-              <a:t>Licencja BSD</a:t>
-            </a:r>
-          </a:p>
-          <a:p>
-            <a:r>
-              <a:rPr lang="pl-PL" dirty="0" err="1" smtClean="0"/>
-              <a:t>Cucumber</a:t>
-            </a:r>
-            <a:r>
-              <a:rPr lang="pl-PL" dirty="0" smtClean="0"/>
-              <a:t> dla środowisk .NET</a:t>
-            </a:r>
-            <a:endParaRPr lang="pl-PL" dirty="0"/>
-          </a:p>
-        </p:txBody>
-      </p:sp>
+        </p:nvPicPr>
+        <p:blipFill>
+          <a:blip r:embed="rId2" cstate="print"/>
+          <a:srcRect/>
+          <a:stretch>
+            <a:fillRect/>
+          </a:stretch>
+        </p:blipFill>
+        <p:spPr bwMode="auto">
+          <a:xfrm>
+            <a:off x="2339752" y="2132856"/>
+            <a:ext cx="4680520" cy="3738237"/>
+          </a:xfrm>
+          <a:prstGeom prst="rect">
+            <a:avLst/>
+          </a:prstGeom>
+          <a:noFill/>
+        </p:spPr>
+      </p:pic>
     </p:spTree>
   </p:cSld>
   <p:clrMapOvr>
     <a:masterClrMapping/>
   </p:clrMapOvr>
-  <p:timing>
-    <p:tnLst>
-      <p:par>
-        <p:cTn id="1" dur="indefinite" restart="never" nodeType="tmRoot"/>
-      </p:par>
-    </p:tnLst>
-  </p:timing>
 </p:sld>
 </file>
 
@@ -9055,46 +9102,51 @@
           <a:p>
             <a:r>
               <a:rPr lang="pl-PL" dirty="0" smtClean="0"/>
-              <a:t>Funkcjonalności</a:t>
+              <a:t>SpecFlow</a:t>
             </a:r>
             <a:endParaRPr lang="pl-PL" dirty="0"/>
           </a:p>
         </p:txBody>
       </p:sp>
-      <p:pic>
-        <p:nvPicPr>
-          <p:cNvPr id="3078" name="Picture 6"/>
-          <p:cNvPicPr>
-            <a:picLocks noGrp="1" noChangeAspect="1" noChangeArrowheads="1"/>
-          </p:cNvPicPr>
+      <p:sp>
+        <p:nvSpPr>
+          <p:cNvPr id="3" name="Symbol zastępczy zawartości 2"/>
+          <p:cNvSpPr>
+            <a:spLocks noGrp="1"/>
+          </p:cNvSpPr>
           <p:nvPr>
             <p:ph idx="1"/>
           </p:nvPr>
-        </p:nvPicPr>
-        <p:blipFill>
-          <a:blip r:embed="rId2" cstate="print"/>
-          <a:srcRect/>
-          <a:stretch>
-            <a:fillRect/>
-          </a:stretch>
-        </p:blipFill>
-        <p:spPr bwMode="auto">
-          <a:xfrm>
-            <a:off x="2271712" y="2079625"/>
-            <a:ext cx="5057775" cy="3981450"/>
-          </a:xfrm>
-          <a:prstGeom prst="rect">
-            <a:avLst/>
-          </a:prstGeom>
-          <a:noFill/>
-          <a:ln w="9525">
-            <a:noFill/>
-            <a:miter lim="800000"/>
-            <a:headEnd/>
-            <a:tailEnd/>
-          </a:ln>
-        </p:spPr>
-      </p:pic>
+        </p:nvSpPr>
+        <p:spPr/>
+        <p:txBody>
+          <a:bodyPr/>
+          <a:lstStyle/>
+          <a:p>
+            <a:r>
+              <a:rPr lang="pl-PL" dirty="0" smtClean="0"/>
+              <a:t>Framework do pisania testów BDD</a:t>
+            </a:r>
+          </a:p>
+          <a:p>
+            <a:r>
+              <a:rPr lang="pl-PL" dirty="0" smtClean="0"/>
+              <a:t>Licencja BSD</a:t>
+            </a:r>
+          </a:p>
+          <a:p>
+            <a:r>
+              <a:rPr lang="pl-PL" dirty="0" smtClean="0"/>
+              <a:t>Cucumber</a:t>
+            </a:r>
+            <a:r>
+              <a:rPr lang="pl-PL" dirty="0" smtClean="0"/>
+              <a:t> dla środowisk .NET</a:t>
+            </a:r>
+            <a:endParaRPr lang="pl-PL" dirty="0"/>
+          </a:p>
+        </p:txBody>
+      </p:sp>
     </p:spTree>
   </p:cSld>
   <p:clrMapOvr>
@@ -9144,7 +9196,7 @@
           <a:p>
             <a:r>
               <a:rPr lang="pl-PL" dirty="0" smtClean="0"/>
-              <a:t>Scenariusze</a:t>
+              <a:t>Funkcjonalności</a:t>
             </a:r>
             <a:endParaRPr lang="pl-PL" dirty="0"/>
           </a:p>
@@ -9152,7 +9204,7 @@
       </p:sp>
       <p:pic>
         <p:nvPicPr>
-          <p:cNvPr id="2055" name="Picture 7"/>
+          <p:cNvPr id="3078" name="Picture 6"/>
           <p:cNvPicPr>
             <a:picLocks noGrp="1" noChangeAspect="1" noChangeArrowheads="1"/>
           </p:cNvPicPr>
@@ -9161,7 +9213,7 @@
           </p:nvPr>
         </p:nvPicPr>
         <p:blipFill>
-          <a:blip r:embed="rId3" cstate="print"/>
+          <a:blip r:embed="rId2" cstate="print"/>
           <a:srcRect/>
           <a:stretch>
             <a:fillRect/>
@@ -9233,7 +9285,7 @@
           <a:p>
             <a:r>
               <a:rPr lang="pl-PL" dirty="0" smtClean="0"/>
-              <a:t>Kroki</a:t>
+              <a:t>Scenariusze</a:t>
             </a:r>
             <a:endParaRPr lang="pl-PL" dirty="0"/>
           </a:p>
@@ -9241,7 +9293,7 @@
       </p:sp>
       <p:pic>
         <p:nvPicPr>
-          <p:cNvPr id="4098" name="Picture 2"/>
+          <p:cNvPr id="2055" name="Picture 7"/>
           <p:cNvPicPr>
             <a:picLocks noGrp="1" noChangeAspect="1" noChangeArrowheads="1"/>
           </p:cNvPicPr>
@@ -9250,7 +9302,7 @@
           </p:nvPr>
         </p:nvPicPr>
         <p:blipFill>
-          <a:blip r:embed="rId2" cstate="print"/>
+          <a:blip r:embed="rId3" cstate="print"/>
           <a:srcRect/>
           <a:stretch>
             <a:fillRect/>
@@ -9258,8 +9310,8 @@
         </p:blipFill>
         <p:spPr bwMode="auto">
           <a:xfrm>
-            <a:off x="962025" y="3175000"/>
-            <a:ext cx="7677150" cy="1790700"/>
+            <a:off x="2271712" y="2079625"/>
+            <a:ext cx="5057775" cy="3981450"/>
           </a:xfrm>
           <a:prstGeom prst="rect">
             <a:avLst/>

</xml_diff>